<commit_message>
Modification Présentation Revue 0
</commit_message>
<xml_diff>
--- a/Diagrammes Communs/Presentation_Revue0.pptx
+++ b/Diagrammes Communs/Presentation_Revue0.pptx
@@ -24,18 +24,19 @@
     <p:sldId id="268" r:id="rId18"/>
     <p:sldId id="288" r:id="rId19"/>
     <p:sldId id="289" r:id="rId20"/>
-    <p:sldId id="270" r:id="rId21"/>
-    <p:sldId id="271" r:id="rId22"/>
-    <p:sldId id="272" r:id="rId23"/>
-    <p:sldId id="273" r:id="rId24"/>
-    <p:sldId id="274" r:id="rId25"/>
-    <p:sldId id="275" r:id="rId26"/>
-    <p:sldId id="276" r:id="rId27"/>
-    <p:sldId id="278" r:id="rId28"/>
-    <p:sldId id="280" r:id="rId29"/>
-    <p:sldId id="283" r:id="rId30"/>
-    <p:sldId id="281" r:id="rId31"/>
-    <p:sldId id="284" r:id="rId32"/>
+    <p:sldId id="290" r:id="rId21"/>
+    <p:sldId id="270" r:id="rId22"/>
+    <p:sldId id="271" r:id="rId23"/>
+    <p:sldId id="272" r:id="rId24"/>
+    <p:sldId id="273" r:id="rId25"/>
+    <p:sldId id="274" r:id="rId26"/>
+    <p:sldId id="275" r:id="rId27"/>
+    <p:sldId id="276" r:id="rId28"/>
+    <p:sldId id="278" r:id="rId29"/>
+    <p:sldId id="280" r:id="rId30"/>
+    <p:sldId id="283" r:id="rId31"/>
+    <p:sldId id="281" r:id="rId32"/>
+    <p:sldId id="284" r:id="rId33"/>
   </p:sldIdLst>
   <p:sldSz cx="12192000" cy="6858000"/>
   <p:notesSz cx="6858000" cy="9144000"/>
@@ -271,7 +272,7 @@
           <a:p>
             <a:fld id="{7BC5C595-FB1D-4FA3-AB00-1D4758E98115}" type="datetimeFigureOut">
               <a:rPr lang="fr-FR" smtClean="0"/>
-              <a:t>29/01/2020</a:t>
+              <a:t>30/01/2020</a:t>
             </a:fld>
             <a:endParaRPr lang="fr-FR"/>
           </a:p>
@@ -439,7 +440,7 @@
           <a:p>
             <a:fld id="{7BC5C595-FB1D-4FA3-AB00-1D4758E98115}" type="datetimeFigureOut">
               <a:rPr lang="fr-FR" smtClean="0"/>
-              <a:t>29/01/2020</a:t>
+              <a:t>30/01/2020</a:t>
             </a:fld>
             <a:endParaRPr lang="fr-FR"/>
           </a:p>
@@ -617,7 +618,7 @@
           <a:p>
             <a:fld id="{7BC5C595-FB1D-4FA3-AB00-1D4758E98115}" type="datetimeFigureOut">
               <a:rPr lang="fr-FR" smtClean="0"/>
-              <a:t>29/01/2020</a:t>
+              <a:t>30/01/2020</a:t>
             </a:fld>
             <a:endParaRPr lang="fr-FR"/>
           </a:p>
@@ -785,7 +786,7 @@
           <a:p>
             <a:fld id="{7BC5C595-FB1D-4FA3-AB00-1D4758E98115}" type="datetimeFigureOut">
               <a:rPr lang="fr-FR" smtClean="0"/>
-              <a:t>29/01/2020</a:t>
+              <a:t>30/01/2020</a:t>
             </a:fld>
             <a:endParaRPr lang="fr-FR"/>
           </a:p>
@@ -1030,7 +1031,7 @@
           <a:p>
             <a:fld id="{7BC5C595-FB1D-4FA3-AB00-1D4758E98115}" type="datetimeFigureOut">
               <a:rPr lang="fr-FR" smtClean="0"/>
-              <a:t>29/01/2020</a:t>
+              <a:t>30/01/2020</a:t>
             </a:fld>
             <a:endParaRPr lang="fr-FR"/>
           </a:p>
@@ -1259,7 +1260,7 @@
           <a:p>
             <a:fld id="{7BC5C595-FB1D-4FA3-AB00-1D4758E98115}" type="datetimeFigureOut">
               <a:rPr lang="fr-FR" smtClean="0"/>
-              <a:t>29/01/2020</a:t>
+              <a:t>30/01/2020</a:t>
             </a:fld>
             <a:endParaRPr lang="fr-FR"/>
           </a:p>
@@ -1623,7 +1624,7 @@
           <a:p>
             <a:fld id="{7BC5C595-FB1D-4FA3-AB00-1D4758E98115}" type="datetimeFigureOut">
               <a:rPr lang="fr-FR" smtClean="0"/>
-              <a:t>29/01/2020</a:t>
+              <a:t>30/01/2020</a:t>
             </a:fld>
             <a:endParaRPr lang="fr-FR"/>
           </a:p>
@@ -1740,7 +1741,7 @@
           <a:p>
             <a:fld id="{7BC5C595-FB1D-4FA3-AB00-1D4758E98115}" type="datetimeFigureOut">
               <a:rPr lang="fr-FR" smtClean="0"/>
-              <a:t>29/01/2020</a:t>
+              <a:t>30/01/2020</a:t>
             </a:fld>
             <a:endParaRPr lang="fr-FR"/>
           </a:p>
@@ -1835,7 +1836,7 @@
           <a:p>
             <a:fld id="{7BC5C595-FB1D-4FA3-AB00-1D4758E98115}" type="datetimeFigureOut">
               <a:rPr lang="fr-FR" smtClean="0"/>
-              <a:t>29/01/2020</a:t>
+              <a:t>30/01/2020</a:t>
             </a:fld>
             <a:endParaRPr lang="fr-FR"/>
           </a:p>
@@ -2110,7 +2111,7 @@
           <a:p>
             <a:fld id="{7BC5C595-FB1D-4FA3-AB00-1D4758E98115}" type="datetimeFigureOut">
               <a:rPr lang="fr-FR" smtClean="0"/>
-              <a:t>29/01/2020</a:t>
+              <a:t>30/01/2020</a:t>
             </a:fld>
             <a:endParaRPr lang="fr-FR"/>
           </a:p>
@@ -2362,7 +2363,7 @@
           <a:p>
             <a:fld id="{7BC5C595-FB1D-4FA3-AB00-1D4758E98115}" type="datetimeFigureOut">
               <a:rPr lang="fr-FR" smtClean="0"/>
-              <a:t>29/01/2020</a:t>
+              <a:t>30/01/2020</a:t>
             </a:fld>
             <a:endParaRPr lang="fr-FR"/>
           </a:p>
@@ -2573,7 +2574,7 @@
           <a:p>
             <a:fld id="{7BC5C595-FB1D-4FA3-AB00-1D4758E98115}" type="datetimeFigureOut">
               <a:rPr lang="fr-FR" smtClean="0"/>
-              <a:t>29/01/2020</a:t>
+              <a:t>30/01/2020</a:t>
             </a:fld>
             <a:endParaRPr lang="fr-FR"/>
           </a:p>
@@ -3667,7 +3668,7 @@
         </p:nvSpPr>
         <p:spPr>
           <a:xfrm>
-            <a:off x="838200" y="3510582"/>
+            <a:off x="838200" y="3042796"/>
             <a:ext cx="10920662" cy="981423"/>
           </a:xfrm>
           <a:prstGeom prst="rect">
@@ -3715,6 +3716,47 @@
           </a:p>
         </p:txBody>
       </p:sp>
+      <p:pic>
+        <p:nvPicPr>
+          <p:cNvPr id="2052" name="Picture 4" descr="Résultat de recherche d'images pour &quot;RFID&quot;&quot;"/>
+          <p:cNvPicPr>
+            <a:picLocks noChangeAspect="1" noChangeArrowheads="1"/>
+          </p:cNvPicPr>
+          <p:nvPr/>
+        </p:nvPicPr>
+        <p:blipFill>
+          <a:blip r:embed="rId2">
+            <a:extLst>
+              <a:ext uri="{28A0092B-C50C-407E-A947-70E740481C1C}">
+                <a14:useLocalDpi xmlns:a14="http://schemas.microsoft.com/office/drawing/2010/main" val="0"/>
+              </a:ext>
+            </a:extLst>
+          </a:blip>
+          <a:srcRect/>
+          <a:stretch>
+            <a:fillRect/>
+          </a:stretch>
+        </p:blipFill>
+        <p:spPr bwMode="auto">
+          <a:xfrm>
+            <a:off x="7069304" y="3668444"/>
+            <a:ext cx="3261393" cy="3189556"/>
+          </a:xfrm>
+          <a:prstGeom prst="rect">
+            <a:avLst/>
+          </a:prstGeom>
+          <a:noFill/>
+          <a:extLst>
+            <a:ext uri="{909E8E84-426E-40DD-AFC4-6F175D3DCCD1}">
+              <a14:hiddenFill xmlns:a14="http://schemas.microsoft.com/office/drawing/2010/main">
+                <a:solidFill>
+                  <a:srgbClr val="FFFFFF"/>
+                </a:solidFill>
+              </a14:hiddenFill>
+            </a:ext>
+          </a:extLst>
+        </p:spPr>
+      </p:pic>
     </p:spTree>
     <p:extLst>
       <p:ext uri="{BB962C8B-B14F-4D97-AF65-F5344CB8AC3E}">
@@ -3833,7 +3875,7 @@
         </p:blipFill>
         <p:spPr>
           <a:xfrm>
-            <a:off x="7684169" y="5053263"/>
+            <a:off x="7812506" y="5053263"/>
             <a:ext cx="2679032" cy="1380374"/>
           </a:xfrm>
           <a:prstGeom prst="rect">
@@ -4121,11 +4163,211 @@
             <a:pPr marL="457200" indent="-457200">
               <a:buAutoNum type="alphaLcParenR"/>
             </a:pPr>
-            <a:r>
-              <a:rPr lang="fr-FR" sz="2400" dirty="0" smtClean="0"/>
-              <a:t>La communication par la puce</a:t>
-            </a:r>
             <a:endParaRPr lang="fr-FR" sz="2400" dirty="0"/>
+          </a:p>
+          <a:p>
+            <a:pPr marL="457200" indent="-457200">
+              <a:buAutoNum type="alphaLcParenR"/>
+            </a:pPr>
+            <a:endParaRPr lang="fr-FR" sz="2400" dirty="0" smtClean="0"/>
+          </a:p>
+          <a:p>
+            <a:pPr marL="457200" indent="-457200">
+              <a:buAutoNum type="alphaLcParenR"/>
+            </a:pPr>
+            <a:endParaRPr lang="fr-FR" sz="2400" dirty="0" smtClean="0"/>
+          </a:p>
+          <a:p>
+            <a:pPr marL="0" indent="0">
+              <a:buNone/>
+            </a:pPr>
+            <a:endParaRPr lang="fr-FR" sz="2400" dirty="0" smtClean="0"/>
+          </a:p>
+        </p:txBody>
+      </p:sp>
+      <p:sp>
+        <p:nvSpPr>
+          <p:cNvPr id="4" name="Rectangle 3"/>
+          <p:cNvSpPr/>
+          <p:nvPr/>
+        </p:nvSpPr>
+        <p:spPr>
+          <a:xfrm>
+            <a:off x="838200" y="2762447"/>
+            <a:ext cx="10515600" cy="2771015"/>
+          </a:xfrm>
+          <a:prstGeom prst="rect">
+            <a:avLst/>
+          </a:prstGeom>
+        </p:spPr>
+        <p:txBody>
+          <a:bodyPr wrap="square">
+            <a:spAutoFit/>
+          </a:bodyPr>
+          <a:lstStyle/>
+          <a:p>
+            <a:pPr>
+              <a:lnSpc>
+                <a:spcPct val="107000"/>
+              </a:lnSpc>
+              <a:spcAft>
+                <a:spcPts val="800"/>
+              </a:spcAft>
+            </a:pPr>
+            <a:r>
+              <a:rPr lang="fr-FR" dirty="0">
+                <a:latin typeface="Calibri" panose="020F0502020204030204" pitchFamily="34" charset="0"/>
+                <a:ea typeface="SimSun" panose="02010600030101010101" pitchFamily="2" charset="-122"/>
+                <a:cs typeface="Times New Roman" panose="02020603050405020304" pitchFamily="18" charset="0"/>
+              </a:rPr>
+              <a:t>La RFID se développe sous différents supports : </a:t>
+            </a:r>
+          </a:p>
+          <a:p>
+            <a:pPr marL="342900" lvl="0" indent="-342900">
+              <a:lnSpc>
+                <a:spcPct val="107000"/>
+              </a:lnSpc>
+              <a:spcAft>
+                <a:spcPts val="0"/>
+              </a:spcAft>
+              <a:buFont typeface="Century Gothic" panose="020B0502020202020204" pitchFamily="34" charset="0"/>
+              <a:buChar char="-"/>
+            </a:pPr>
+            <a:r>
+              <a:rPr lang="fr-FR" dirty="0">
+                <a:latin typeface="Calibri" panose="020F0502020204030204" pitchFamily="34" charset="0"/>
+                <a:ea typeface="SimSun" panose="02010600030101010101" pitchFamily="2" charset="-122"/>
+                <a:cs typeface="Times New Roman" panose="02020603050405020304" pitchFamily="18" charset="0"/>
+              </a:rPr>
+              <a:t>La carte/badge RFID,</a:t>
+            </a:r>
+          </a:p>
+          <a:p>
+            <a:pPr marL="342900" lvl="0" indent="-342900">
+              <a:lnSpc>
+                <a:spcPct val="107000"/>
+              </a:lnSpc>
+              <a:spcAft>
+                <a:spcPts val="0"/>
+              </a:spcAft>
+              <a:buFont typeface="Century Gothic" panose="020B0502020202020204" pitchFamily="34" charset="0"/>
+              <a:buChar char="-"/>
+            </a:pPr>
+            <a:r>
+              <a:rPr lang="fr-FR" dirty="0">
+                <a:latin typeface="Calibri" panose="020F0502020204030204" pitchFamily="34" charset="0"/>
+                <a:ea typeface="SimSun" panose="02010600030101010101" pitchFamily="2" charset="-122"/>
+                <a:cs typeface="Times New Roman" panose="02020603050405020304" pitchFamily="18" charset="0"/>
+              </a:rPr>
+              <a:t>Étiquettes, stickers et dossard,</a:t>
+            </a:r>
+          </a:p>
+          <a:p>
+            <a:pPr marL="342900" lvl="0" indent="-342900">
+              <a:lnSpc>
+                <a:spcPct val="107000"/>
+              </a:lnSpc>
+              <a:spcAft>
+                <a:spcPts val="0"/>
+              </a:spcAft>
+              <a:buFont typeface="Century Gothic" panose="020B0502020202020204" pitchFamily="34" charset="0"/>
+              <a:buChar char="-"/>
+            </a:pPr>
+            <a:r>
+              <a:rPr lang="fr-FR" dirty="0">
+                <a:latin typeface="Calibri" panose="020F0502020204030204" pitchFamily="34" charset="0"/>
+                <a:ea typeface="SimSun" panose="02010600030101010101" pitchFamily="2" charset="-122"/>
+                <a:cs typeface="Times New Roman" panose="02020603050405020304" pitchFamily="18" charset="0"/>
+              </a:rPr>
+              <a:t>Bracelets,</a:t>
+            </a:r>
+          </a:p>
+          <a:p>
+            <a:pPr marL="342900" lvl="0" indent="-342900">
+              <a:lnSpc>
+                <a:spcPct val="107000"/>
+              </a:lnSpc>
+              <a:spcAft>
+                <a:spcPts val="0"/>
+              </a:spcAft>
+              <a:buFont typeface="Century Gothic" panose="020B0502020202020204" pitchFamily="34" charset="0"/>
+              <a:buChar char="-"/>
+            </a:pPr>
+            <a:r>
+              <a:rPr lang="fr-FR" dirty="0">
+                <a:latin typeface="Calibri" panose="020F0502020204030204" pitchFamily="34" charset="0"/>
+                <a:ea typeface="SimSun" panose="02010600030101010101" pitchFamily="2" charset="-122"/>
+                <a:cs typeface="Times New Roman" panose="02020603050405020304" pitchFamily="18" charset="0"/>
+              </a:rPr>
+              <a:t>Porte-clés et tags,</a:t>
+            </a:r>
+          </a:p>
+          <a:p>
+            <a:pPr marL="342900" lvl="0" indent="-342900">
+              <a:lnSpc>
+                <a:spcPct val="107000"/>
+              </a:lnSpc>
+              <a:spcAft>
+                <a:spcPts val="800"/>
+              </a:spcAft>
+              <a:buFont typeface="Century Gothic" panose="020B0502020202020204" pitchFamily="34" charset="0"/>
+              <a:buChar char="-"/>
+            </a:pPr>
+            <a:r>
+              <a:rPr lang="fr-FR" dirty="0">
+                <a:latin typeface="Calibri" panose="020F0502020204030204" pitchFamily="34" charset="0"/>
+                <a:ea typeface="SimSun" panose="02010600030101010101" pitchFamily="2" charset="-122"/>
+                <a:cs typeface="Times New Roman" panose="02020603050405020304" pitchFamily="18" charset="0"/>
+              </a:rPr>
+              <a:t>Puces sous cutanés</a:t>
+            </a:r>
+            <a:r>
+              <a:rPr lang="fr-FR" dirty="0" smtClean="0">
+                <a:latin typeface="Calibri" panose="020F0502020204030204" pitchFamily="34" charset="0"/>
+                <a:ea typeface="SimSun" panose="02010600030101010101" pitchFamily="2" charset="-122"/>
+                <a:cs typeface="Times New Roman" panose="02020603050405020304" pitchFamily="18" charset="0"/>
+              </a:rPr>
+              <a:t>.</a:t>
+            </a:r>
+          </a:p>
+          <a:p>
+            <a:pPr lvl="0">
+              <a:lnSpc>
+                <a:spcPct val="107000"/>
+              </a:lnSpc>
+              <a:spcAft>
+                <a:spcPts val="800"/>
+              </a:spcAft>
+            </a:pPr>
+            <a:endParaRPr lang="fr-FR" dirty="0" smtClean="0">
+              <a:latin typeface="Calibri" panose="020F0502020204030204" pitchFamily="34" charset="0"/>
+              <a:ea typeface="SimSun" panose="02010600030101010101" pitchFamily="2" charset="-122"/>
+              <a:cs typeface="Times New Roman" panose="02020603050405020304" pitchFamily="18" charset="0"/>
+            </a:endParaRPr>
+          </a:p>
+          <a:p>
+            <a:pPr lvl="0">
+              <a:lnSpc>
+                <a:spcPct val="107000"/>
+              </a:lnSpc>
+              <a:spcAft>
+                <a:spcPts val="800"/>
+              </a:spcAft>
+            </a:pPr>
+            <a:r>
+              <a:rPr lang="fr-FR" dirty="0" smtClean="0">
+                <a:latin typeface="Calibri" panose="020F0502020204030204" pitchFamily="34" charset="0"/>
+                <a:ea typeface="SimSun" panose="02010600030101010101" pitchFamily="2" charset="-122"/>
+                <a:cs typeface="Times New Roman" panose="02020603050405020304" pitchFamily="18" charset="0"/>
+              </a:rPr>
+              <a:t>Nous allons utiliser le dossard car moins coûteux et plus pratique pour le coureur d’accrocher un dossard.</a:t>
+            </a:r>
+            <a:endParaRPr lang="fr-FR" dirty="0">
+              <a:latin typeface="Calibri" panose="020F0502020204030204" pitchFamily="34" charset="0"/>
+              <a:ea typeface="SimSun" panose="02010600030101010101" pitchFamily="2" charset="-122"/>
+              <a:cs typeface="Times New Roman" panose="02020603050405020304" pitchFamily="18" charset="0"/>
+            </a:endParaRPr>
           </a:p>
         </p:txBody>
       </p:sp>
@@ -4231,9 +4473,839 @@
             </a:pPr>
             <a:r>
               <a:rPr lang="fr-FR" sz="2400" dirty="0" smtClean="0"/>
-              <a:t>c) Les capacités de la puce RFID</a:t>
-            </a:r>
+              <a:t>b) La </a:t>
+            </a:r>
+            <a:r>
+              <a:rPr lang="fr-FR" sz="2400" dirty="0"/>
+              <a:t>communication par la puce</a:t>
+            </a:r>
+          </a:p>
+          <a:p>
+            <a:pPr marL="0" indent="0">
+              <a:buNone/>
+            </a:pPr>
+            <a:endParaRPr lang="fr-FR" sz="2400" dirty="0" smtClean="0"/>
+          </a:p>
+          <a:p>
+            <a:pPr marL="0" indent="0">
+              <a:buNone/>
+            </a:pPr>
             <a:endParaRPr lang="fr-FR" sz="2400" dirty="0"/>
+          </a:p>
+          <a:p>
+            <a:pPr marL="0" indent="0">
+              <a:buNone/>
+            </a:pPr>
+            <a:endParaRPr lang="fr-FR" sz="2400" dirty="0" smtClean="0"/>
+          </a:p>
+          <a:p>
+            <a:pPr marL="0" indent="0">
+              <a:buNone/>
+            </a:pPr>
+            <a:endParaRPr lang="fr-FR" sz="2400" dirty="0" smtClean="0"/>
+          </a:p>
+        </p:txBody>
+      </p:sp>
+      <p:graphicFrame>
+        <p:nvGraphicFramePr>
+          <p:cNvPr id="4" name="Tableau 3"/>
+          <p:cNvGraphicFramePr>
+            <a:graphicFrameLocks noGrp="1"/>
+          </p:cNvGraphicFramePr>
+          <p:nvPr>
+            <p:extLst>
+              <p:ext uri="{D42A27DB-BD31-4B8C-83A1-F6EECF244321}">
+                <p14:modId xmlns:p14="http://schemas.microsoft.com/office/powerpoint/2010/main" val="2666037922"/>
+              </p:ext>
+            </p:extLst>
+          </p:nvPr>
+        </p:nvGraphicFramePr>
+        <p:xfrm>
+          <a:off x="2165684" y="3166175"/>
+          <a:ext cx="7523748" cy="2768110"/>
+        </p:xfrm>
+        <a:graphic>
+          <a:graphicData uri="http://schemas.openxmlformats.org/drawingml/2006/table">
+            <a:tbl>
+              <a:tblPr firstRow="1" firstCol="1" bandRow="1">
+                <a:tableStyleId>{5C22544A-7EE6-4342-B048-85BDC9FD1C3A}</a:tableStyleId>
+              </a:tblPr>
+              <a:tblGrid>
+                <a:gridCol w="2016903">
+                  <a:extLst>
+                    <a:ext uri="{9D8B030D-6E8A-4147-A177-3AD203B41FA5}">
+                      <a16:colId xmlns:a16="http://schemas.microsoft.com/office/drawing/2014/main" val="1898678733"/>
+                    </a:ext>
+                  </a:extLst>
+                </a:gridCol>
+                <a:gridCol w="1572932">
+                  <a:extLst>
+                    <a:ext uri="{9D8B030D-6E8A-4147-A177-3AD203B41FA5}">
+                      <a16:colId xmlns:a16="http://schemas.microsoft.com/office/drawing/2014/main" val="2108743470"/>
+                    </a:ext>
+                  </a:extLst>
+                </a:gridCol>
+                <a:gridCol w="1236781">
+                  <a:extLst>
+                    <a:ext uri="{9D8B030D-6E8A-4147-A177-3AD203B41FA5}">
+                      <a16:colId xmlns:a16="http://schemas.microsoft.com/office/drawing/2014/main" val="1845721073"/>
+                    </a:ext>
+                  </a:extLst>
+                </a:gridCol>
+                <a:gridCol w="1235987">
+                  <a:extLst>
+                    <a:ext uri="{9D8B030D-6E8A-4147-A177-3AD203B41FA5}">
+                      <a16:colId xmlns:a16="http://schemas.microsoft.com/office/drawing/2014/main" val="2681023132"/>
+                    </a:ext>
+                  </a:extLst>
+                </a:gridCol>
+                <a:gridCol w="1461145">
+                  <a:extLst>
+                    <a:ext uri="{9D8B030D-6E8A-4147-A177-3AD203B41FA5}">
+                      <a16:colId xmlns:a16="http://schemas.microsoft.com/office/drawing/2014/main" val="178689981"/>
+                    </a:ext>
+                  </a:extLst>
+                </a:gridCol>
+              </a:tblGrid>
+              <a:tr h="705852">
+                <a:tc>
+                  <a:txBody>
+                    <a:bodyPr/>
+                    <a:lstStyle/>
+                    <a:p>
+                      <a:pPr algn="ctr">
+                        <a:lnSpc>
+                          <a:spcPct val="107000"/>
+                        </a:lnSpc>
+                        <a:spcAft>
+                          <a:spcPts val="0"/>
+                        </a:spcAft>
+                      </a:pPr>
+                      <a:r>
+                        <a:rPr lang="fr-FR" sz="1800">
+                          <a:effectLst/>
+                        </a:rPr>
+                        <a:t>Types de fréquence</a:t>
+                      </a:r>
+                      <a:endParaRPr lang="fr-FR" sz="1600">
+                        <a:effectLst/>
+                        <a:latin typeface="Calibri" panose="020F0502020204030204" pitchFamily="34" charset="0"/>
+                        <a:ea typeface="SimSun" panose="02010600030101010101" pitchFamily="2" charset="-122"/>
+                        <a:cs typeface="Times New Roman" panose="02020603050405020304" pitchFamily="18" charset="0"/>
+                      </a:endParaRPr>
+                    </a:p>
+                  </a:txBody>
+                  <a:tcPr marL="9525" marR="9525" marT="9525" marB="9525" anchor="ctr"/>
+                </a:tc>
+                <a:tc>
+                  <a:txBody>
+                    <a:bodyPr/>
+                    <a:lstStyle/>
+                    <a:p>
+                      <a:pPr algn="ctr">
+                        <a:lnSpc>
+                          <a:spcPct val="107000"/>
+                        </a:lnSpc>
+                        <a:spcAft>
+                          <a:spcPts val="0"/>
+                        </a:spcAft>
+                      </a:pPr>
+                      <a:r>
+                        <a:rPr lang="fr-FR" sz="1800" dirty="0">
+                          <a:effectLst/>
+                        </a:rPr>
+                        <a:t>Fréquence de fonctionnement</a:t>
+                      </a:r>
+                      <a:endParaRPr lang="fr-FR" sz="1600" dirty="0">
+                        <a:effectLst/>
+                        <a:latin typeface="Calibri" panose="020F0502020204030204" pitchFamily="34" charset="0"/>
+                        <a:ea typeface="SimSun" panose="02010600030101010101" pitchFamily="2" charset="-122"/>
+                        <a:cs typeface="Times New Roman" panose="02020603050405020304" pitchFamily="18" charset="0"/>
+                      </a:endParaRPr>
+                    </a:p>
+                  </a:txBody>
+                  <a:tcPr marL="9525" marR="9525" marT="9525" marB="9525" anchor="ctr"/>
+                </a:tc>
+                <a:tc>
+                  <a:txBody>
+                    <a:bodyPr/>
+                    <a:lstStyle/>
+                    <a:p>
+                      <a:pPr algn="ctr">
+                        <a:lnSpc>
+                          <a:spcPct val="107000"/>
+                        </a:lnSpc>
+                        <a:spcAft>
+                          <a:spcPts val="0"/>
+                        </a:spcAft>
+                      </a:pPr>
+                      <a:r>
+                        <a:rPr lang="fr-FR" sz="1800">
+                          <a:effectLst/>
+                        </a:rPr>
+                        <a:t>Distance de lecture (m)</a:t>
+                      </a:r>
+                      <a:endParaRPr lang="fr-FR" sz="1600">
+                        <a:effectLst/>
+                        <a:latin typeface="Calibri" panose="020F0502020204030204" pitchFamily="34" charset="0"/>
+                        <a:ea typeface="SimSun" panose="02010600030101010101" pitchFamily="2" charset="-122"/>
+                        <a:cs typeface="Times New Roman" panose="02020603050405020304" pitchFamily="18" charset="0"/>
+                      </a:endParaRPr>
+                    </a:p>
+                  </a:txBody>
+                  <a:tcPr marL="9525" marR="9525" marT="9525" marB="9525" anchor="ctr"/>
+                </a:tc>
+                <a:tc>
+                  <a:txBody>
+                    <a:bodyPr/>
+                    <a:lstStyle/>
+                    <a:p>
+                      <a:pPr algn="ctr">
+                        <a:lnSpc>
+                          <a:spcPct val="107000"/>
+                        </a:lnSpc>
+                        <a:spcAft>
+                          <a:spcPts val="0"/>
+                        </a:spcAft>
+                      </a:pPr>
+                      <a:r>
+                        <a:rPr lang="fr-FR" sz="1800">
+                          <a:effectLst/>
+                        </a:rPr>
+                        <a:t>Taux de transfert</a:t>
+                      </a:r>
+                      <a:endParaRPr lang="fr-FR" sz="1600">
+                        <a:effectLst/>
+                        <a:latin typeface="Calibri" panose="020F0502020204030204" pitchFamily="34" charset="0"/>
+                        <a:ea typeface="SimSun" panose="02010600030101010101" pitchFamily="2" charset="-122"/>
+                        <a:cs typeface="Times New Roman" panose="02020603050405020304" pitchFamily="18" charset="0"/>
+                      </a:endParaRPr>
+                    </a:p>
+                  </a:txBody>
+                  <a:tcPr marL="9525" marR="9525" marT="9525" marB="9525" anchor="ctr"/>
+                </a:tc>
+                <a:tc>
+                  <a:txBody>
+                    <a:bodyPr/>
+                    <a:lstStyle/>
+                    <a:p>
+                      <a:pPr algn="ctr">
+                        <a:lnSpc>
+                          <a:spcPct val="107000"/>
+                        </a:lnSpc>
+                        <a:spcAft>
+                          <a:spcPts val="0"/>
+                        </a:spcAft>
+                      </a:pPr>
+                      <a:r>
+                        <a:rPr lang="fr-FR" sz="1800" dirty="0">
+                          <a:effectLst/>
+                        </a:rPr>
+                        <a:t>Normes</a:t>
+                      </a:r>
+                      <a:endParaRPr lang="fr-FR" sz="1600" dirty="0">
+                        <a:effectLst/>
+                        <a:latin typeface="Calibri" panose="020F0502020204030204" pitchFamily="34" charset="0"/>
+                        <a:ea typeface="SimSun" panose="02010600030101010101" pitchFamily="2" charset="-122"/>
+                        <a:cs typeface="Times New Roman" panose="02020603050405020304" pitchFamily="18" charset="0"/>
+                      </a:endParaRPr>
+                    </a:p>
+                  </a:txBody>
+                  <a:tcPr marL="9525" marR="9525" marT="9525" marB="9525" anchor="ctr"/>
+                </a:tc>
+                <a:extLst>
+                  <a:ext uri="{0D108BD9-81ED-4DB2-BD59-A6C34878D82A}">
+                    <a16:rowId xmlns:a16="http://schemas.microsoft.com/office/drawing/2014/main" val="1271001505"/>
+                  </a:ext>
+                </a:extLst>
+              </a:tr>
+              <a:tr h="588858">
+                <a:tc>
+                  <a:txBody>
+                    <a:bodyPr/>
+                    <a:lstStyle/>
+                    <a:p>
+                      <a:pPr algn="ctr">
+                        <a:lnSpc>
+                          <a:spcPct val="107000"/>
+                        </a:lnSpc>
+                        <a:spcAft>
+                          <a:spcPts val="0"/>
+                        </a:spcAft>
+                      </a:pPr>
+                      <a:r>
+                        <a:rPr lang="fr-FR" sz="1800" dirty="0">
+                          <a:effectLst/>
+                        </a:rPr>
+                        <a:t>Basse fréquence</a:t>
+                      </a:r>
+                      <a:endParaRPr lang="fr-FR" sz="1600" dirty="0">
+                        <a:effectLst/>
+                        <a:latin typeface="Calibri" panose="020F0502020204030204" pitchFamily="34" charset="0"/>
+                        <a:ea typeface="SimSun" panose="02010600030101010101" pitchFamily="2" charset="-122"/>
+                        <a:cs typeface="Times New Roman" panose="02020603050405020304" pitchFamily="18" charset="0"/>
+                      </a:endParaRPr>
+                    </a:p>
+                  </a:txBody>
+                  <a:tcPr marL="9525" marR="9525" marT="9525" marB="9525" anchor="ctr"/>
+                </a:tc>
+                <a:tc>
+                  <a:txBody>
+                    <a:bodyPr/>
+                    <a:lstStyle/>
+                    <a:p>
+                      <a:pPr algn="ctr">
+                        <a:lnSpc>
+                          <a:spcPct val="107000"/>
+                        </a:lnSpc>
+                        <a:spcAft>
+                          <a:spcPts val="0"/>
+                        </a:spcAft>
+                      </a:pPr>
+                      <a:r>
+                        <a:rPr lang="fr-FR" sz="1800">
+                          <a:effectLst/>
+                        </a:rPr>
+                        <a:t>&lt; 135 kHz</a:t>
+                      </a:r>
+                      <a:endParaRPr lang="fr-FR" sz="1600">
+                        <a:effectLst/>
+                        <a:latin typeface="Calibri" panose="020F0502020204030204" pitchFamily="34" charset="0"/>
+                        <a:ea typeface="SimSun" panose="02010600030101010101" pitchFamily="2" charset="-122"/>
+                        <a:cs typeface="Times New Roman" panose="02020603050405020304" pitchFamily="18" charset="0"/>
+                      </a:endParaRPr>
+                    </a:p>
+                  </a:txBody>
+                  <a:tcPr marL="9525" marR="9525" marT="9525" marB="9525" anchor="ctr"/>
+                </a:tc>
+                <a:tc>
+                  <a:txBody>
+                    <a:bodyPr/>
+                    <a:lstStyle/>
+                    <a:p>
+                      <a:pPr algn="ctr">
+                        <a:lnSpc>
+                          <a:spcPct val="107000"/>
+                        </a:lnSpc>
+                        <a:spcAft>
+                          <a:spcPts val="0"/>
+                        </a:spcAft>
+                      </a:pPr>
+                      <a:r>
+                        <a:rPr lang="fr-FR" sz="1800" dirty="0">
+                          <a:effectLst/>
+                        </a:rPr>
+                        <a:t>0.5</a:t>
+                      </a:r>
+                      <a:endParaRPr lang="fr-FR" sz="1600" dirty="0">
+                        <a:effectLst/>
+                        <a:latin typeface="Calibri" panose="020F0502020204030204" pitchFamily="34" charset="0"/>
+                        <a:ea typeface="SimSun" panose="02010600030101010101" pitchFamily="2" charset="-122"/>
+                        <a:cs typeface="Times New Roman" panose="02020603050405020304" pitchFamily="18" charset="0"/>
+                      </a:endParaRPr>
+                    </a:p>
+                  </a:txBody>
+                  <a:tcPr marL="9525" marR="9525" marT="9525" marB="9525" anchor="ctr"/>
+                </a:tc>
+                <a:tc>
+                  <a:txBody>
+                    <a:bodyPr/>
+                    <a:lstStyle/>
+                    <a:p>
+                      <a:pPr algn="ctr">
+                        <a:lnSpc>
+                          <a:spcPct val="107000"/>
+                        </a:lnSpc>
+                        <a:spcAft>
+                          <a:spcPts val="0"/>
+                        </a:spcAft>
+                      </a:pPr>
+                      <a:r>
+                        <a:rPr lang="fr-FR" sz="1800" dirty="0">
+                          <a:effectLst/>
+                        </a:rPr>
+                        <a:t>1kb/s</a:t>
+                      </a:r>
+                      <a:endParaRPr lang="fr-FR" sz="1600" dirty="0">
+                        <a:effectLst/>
+                        <a:latin typeface="Calibri" panose="020F0502020204030204" pitchFamily="34" charset="0"/>
+                        <a:ea typeface="SimSun" panose="02010600030101010101" pitchFamily="2" charset="-122"/>
+                        <a:cs typeface="Times New Roman" panose="02020603050405020304" pitchFamily="18" charset="0"/>
+                      </a:endParaRPr>
+                    </a:p>
+                  </a:txBody>
+                  <a:tcPr marL="9525" marR="9525" marT="9525" marB="9525" anchor="ctr"/>
+                </a:tc>
+                <a:tc>
+                  <a:txBody>
+                    <a:bodyPr/>
+                    <a:lstStyle/>
+                    <a:p>
+                      <a:pPr algn="ctr">
+                        <a:lnSpc>
+                          <a:spcPct val="107000"/>
+                        </a:lnSpc>
+                        <a:spcAft>
+                          <a:spcPts val="0"/>
+                        </a:spcAft>
+                      </a:pPr>
+                      <a:r>
+                        <a:rPr lang="fr-FR" sz="1800" dirty="0">
+                          <a:effectLst/>
+                        </a:rPr>
+                        <a:t>ISO 142231 </a:t>
+                      </a:r>
+                      <a:endParaRPr lang="fr-FR" sz="1600" dirty="0">
+                        <a:effectLst/>
+                      </a:endParaRPr>
+                    </a:p>
+                    <a:p>
+                      <a:pPr algn="ctr">
+                        <a:lnSpc>
+                          <a:spcPct val="107000"/>
+                        </a:lnSpc>
+                        <a:spcAft>
+                          <a:spcPts val="0"/>
+                        </a:spcAft>
+                      </a:pPr>
+                      <a:r>
+                        <a:rPr lang="fr-FR" sz="1800" dirty="0">
+                          <a:effectLst/>
+                        </a:rPr>
+                        <a:t>ISO 18000-2</a:t>
+                      </a:r>
+                      <a:endParaRPr lang="fr-FR" sz="1600" dirty="0">
+                        <a:effectLst/>
+                        <a:latin typeface="Calibri" panose="020F0502020204030204" pitchFamily="34" charset="0"/>
+                        <a:ea typeface="SimSun" panose="02010600030101010101" pitchFamily="2" charset="-122"/>
+                        <a:cs typeface="Times New Roman" panose="02020603050405020304" pitchFamily="18" charset="0"/>
+                      </a:endParaRPr>
+                    </a:p>
+                  </a:txBody>
+                  <a:tcPr marL="9525" marR="9525" marT="9525" marB="9525" anchor="ctr"/>
+                </a:tc>
+                <a:extLst>
+                  <a:ext uri="{0D108BD9-81ED-4DB2-BD59-A6C34878D82A}">
+                    <a16:rowId xmlns:a16="http://schemas.microsoft.com/office/drawing/2014/main" val="1865334977"/>
+                  </a:ext>
+                </a:extLst>
+              </a:tr>
+              <a:tr h="1161137">
+                <a:tc>
+                  <a:txBody>
+                    <a:bodyPr/>
+                    <a:lstStyle/>
+                    <a:p>
+                      <a:pPr algn="ctr">
+                        <a:lnSpc>
+                          <a:spcPct val="107000"/>
+                        </a:lnSpc>
+                        <a:spcAft>
+                          <a:spcPts val="0"/>
+                        </a:spcAft>
+                      </a:pPr>
+                      <a:r>
+                        <a:rPr lang="fr-FR" sz="1800" dirty="0">
+                          <a:effectLst/>
+                        </a:rPr>
+                        <a:t>Haute fréquence</a:t>
+                      </a:r>
+                      <a:endParaRPr lang="fr-FR" sz="1600" dirty="0">
+                        <a:effectLst/>
+                        <a:latin typeface="Calibri" panose="020F0502020204030204" pitchFamily="34" charset="0"/>
+                        <a:ea typeface="SimSun" panose="02010600030101010101" pitchFamily="2" charset="-122"/>
+                        <a:cs typeface="Times New Roman" panose="02020603050405020304" pitchFamily="18" charset="0"/>
+                      </a:endParaRPr>
+                    </a:p>
+                  </a:txBody>
+                  <a:tcPr marL="9525" marR="9525" marT="9525" marB="9525" anchor="ctr"/>
+                </a:tc>
+                <a:tc>
+                  <a:txBody>
+                    <a:bodyPr/>
+                    <a:lstStyle/>
+                    <a:p>
+                      <a:pPr algn="ctr">
+                        <a:lnSpc>
+                          <a:spcPct val="107000"/>
+                        </a:lnSpc>
+                        <a:spcAft>
+                          <a:spcPts val="0"/>
+                        </a:spcAft>
+                      </a:pPr>
+                      <a:r>
+                        <a:rPr lang="fr-FR" sz="1800" dirty="0">
+                          <a:effectLst/>
+                        </a:rPr>
+                        <a:t>13,56 Mhz</a:t>
+                      </a:r>
+                      <a:endParaRPr lang="fr-FR" sz="1600" dirty="0">
+                        <a:effectLst/>
+                        <a:latin typeface="Calibri" panose="020F0502020204030204" pitchFamily="34" charset="0"/>
+                        <a:ea typeface="SimSun" panose="02010600030101010101" pitchFamily="2" charset="-122"/>
+                        <a:cs typeface="Times New Roman" panose="02020603050405020304" pitchFamily="18" charset="0"/>
+                      </a:endParaRPr>
+                    </a:p>
+                  </a:txBody>
+                  <a:tcPr marL="9525" marR="9525" marT="9525" marB="9525" anchor="ctr"/>
+                </a:tc>
+                <a:tc>
+                  <a:txBody>
+                    <a:bodyPr/>
+                    <a:lstStyle/>
+                    <a:p>
+                      <a:pPr algn="ctr">
+                        <a:lnSpc>
+                          <a:spcPct val="107000"/>
+                        </a:lnSpc>
+                        <a:spcAft>
+                          <a:spcPts val="0"/>
+                        </a:spcAft>
+                      </a:pPr>
+                      <a:r>
+                        <a:rPr lang="fr-FR" sz="1800" dirty="0">
+                          <a:effectLst/>
+                        </a:rPr>
+                        <a:t>1</a:t>
+                      </a:r>
+                      <a:endParaRPr lang="fr-FR" sz="1600" dirty="0">
+                        <a:effectLst/>
+                        <a:latin typeface="Calibri" panose="020F0502020204030204" pitchFamily="34" charset="0"/>
+                        <a:ea typeface="SimSun" panose="02010600030101010101" pitchFamily="2" charset="-122"/>
+                        <a:cs typeface="Times New Roman" panose="02020603050405020304" pitchFamily="18" charset="0"/>
+                      </a:endParaRPr>
+                    </a:p>
+                  </a:txBody>
+                  <a:tcPr marL="9525" marR="9525" marT="9525" marB="9525" anchor="ctr"/>
+                </a:tc>
+                <a:tc>
+                  <a:txBody>
+                    <a:bodyPr/>
+                    <a:lstStyle/>
+                    <a:p>
+                      <a:pPr algn="ctr">
+                        <a:lnSpc>
+                          <a:spcPct val="107000"/>
+                        </a:lnSpc>
+                        <a:spcAft>
+                          <a:spcPts val="0"/>
+                        </a:spcAft>
+                      </a:pPr>
+                      <a:r>
+                        <a:rPr lang="fr-FR" sz="1800" dirty="0">
+                          <a:effectLst/>
+                        </a:rPr>
+                        <a:t>25kb/s</a:t>
+                      </a:r>
+                      <a:endParaRPr lang="fr-FR" sz="1600" dirty="0">
+                        <a:effectLst/>
+                        <a:latin typeface="Calibri" panose="020F0502020204030204" pitchFamily="34" charset="0"/>
+                        <a:ea typeface="SimSun" panose="02010600030101010101" pitchFamily="2" charset="-122"/>
+                        <a:cs typeface="Times New Roman" panose="02020603050405020304" pitchFamily="18" charset="0"/>
+                      </a:endParaRPr>
+                    </a:p>
+                  </a:txBody>
+                  <a:tcPr marL="9525" marR="9525" marT="9525" marB="9525" anchor="ctr"/>
+                </a:tc>
+                <a:tc>
+                  <a:txBody>
+                    <a:bodyPr/>
+                    <a:lstStyle/>
+                    <a:p>
+                      <a:pPr algn="ctr">
+                        <a:lnSpc>
+                          <a:spcPct val="107000"/>
+                        </a:lnSpc>
+                        <a:spcAft>
+                          <a:spcPts val="800"/>
+                        </a:spcAft>
+                      </a:pPr>
+                      <a:r>
+                        <a:rPr lang="fr-FR" sz="1800">
+                          <a:effectLst/>
+                        </a:rPr>
+                        <a:t>ISO 14443</a:t>
+                      </a:r>
+                      <a:endParaRPr lang="fr-FR" sz="1600">
+                        <a:effectLst/>
+                      </a:endParaRPr>
+                    </a:p>
+                    <a:p>
+                      <a:pPr algn="ctr">
+                        <a:lnSpc>
+                          <a:spcPct val="107000"/>
+                        </a:lnSpc>
+                        <a:spcAft>
+                          <a:spcPts val="800"/>
+                        </a:spcAft>
+                      </a:pPr>
+                      <a:r>
+                        <a:rPr lang="fr-FR" sz="1800">
+                          <a:effectLst/>
+                        </a:rPr>
+                        <a:t>ISO 15693</a:t>
+                      </a:r>
+                      <a:endParaRPr lang="fr-FR" sz="1600">
+                        <a:effectLst/>
+                      </a:endParaRPr>
+                    </a:p>
+                    <a:p>
+                      <a:pPr algn="ctr">
+                        <a:lnSpc>
+                          <a:spcPct val="107000"/>
+                        </a:lnSpc>
+                        <a:spcAft>
+                          <a:spcPts val="800"/>
+                        </a:spcAft>
+                      </a:pPr>
+                      <a:r>
+                        <a:rPr lang="fr-FR" sz="1800">
+                          <a:effectLst/>
+                        </a:rPr>
+                        <a:t>ISO 18000-3</a:t>
+                      </a:r>
+                      <a:endParaRPr lang="fr-FR" sz="1600">
+                        <a:effectLst/>
+                        <a:latin typeface="Calibri" panose="020F0502020204030204" pitchFamily="34" charset="0"/>
+                        <a:ea typeface="SimSun" panose="02010600030101010101" pitchFamily="2" charset="-122"/>
+                        <a:cs typeface="Times New Roman" panose="02020603050405020304" pitchFamily="18" charset="0"/>
+                      </a:endParaRPr>
+                    </a:p>
+                  </a:txBody>
+                  <a:tcPr marL="9525" marR="9525" marT="9525" marB="9525" anchor="ctr"/>
+                </a:tc>
+                <a:extLst>
+                  <a:ext uri="{0D108BD9-81ED-4DB2-BD59-A6C34878D82A}">
+                    <a16:rowId xmlns:a16="http://schemas.microsoft.com/office/drawing/2014/main" val="257736093"/>
+                  </a:ext>
+                </a:extLst>
+              </a:tr>
+              <a:tr h="308094">
+                <a:tc>
+                  <a:txBody>
+                    <a:bodyPr/>
+                    <a:lstStyle/>
+                    <a:p>
+                      <a:pPr algn="ctr">
+                        <a:lnSpc>
+                          <a:spcPct val="107000"/>
+                        </a:lnSpc>
+                        <a:spcAft>
+                          <a:spcPts val="0"/>
+                        </a:spcAft>
+                      </a:pPr>
+                      <a:r>
+                        <a:rPr lang="fr-FR" sz="1800" dirty="0">
+                          <a:effectLst/>
+                        </a:rPr>
+                        <a:t>Très haute fréquence</a:t>
+                      </a:r>
+                      <a:endParaRPr lang="fr-FR" sz="1600" dirty="0">
+                        <a:effectLst/>
+                        <a:latin typeface="Calibri" panose="020F0502020204030204" pitchFamily="34" charset="0"/>
+                        <a:ea typeface="SimSun" panose="02010600030101010101" pitchFamily="2" charset="-122"/>
+                        <a:cs typeface="Times New Roman" panose="02020603050405020304" pitchFamily="18" charset="0"/>
+                      </a:endParaRPr>
+                    </a:p>
+                  </a:txBody>
+                  <a:tcPr marL="9525" marR="9525" marT="9525" marB="9525" anchor="ctr"/>
+                </a:tc>
+                <a:tc>
+                  <a:txBody>
+                    <a:bodyPr/>
+                    <a:lstStyle/>
+                    <a:p>
+                      <a:pPr algn="ctr">
+                        <a:lnSpc>
+                          <a:spcPct val="107000"/>
+                        </a:lnSpc>
+                        <a:spcAft>
+                          <a:spcPts val="0"/>
+                        </a:spcAft>
+                      </a:pPr>
+                      <a:r>
+                        <a:rPr lang="fr-FR" sz="1800" dirty="0">
+                          <a:effectLst/>
+                        </a:rPr>
+                        <a:t>863 à 915 Mhz</a:t>
+                      </a:r>
+                      <a:endParaRPr lang="fr-FR" sz="1600" dirty="0">
+                        <a:effectLst/>
+                        <a:latin typeface="Calibri" panose="020F0502020204030204" pitchFamily="34" charset="0"/>
+                        <a:ea typeface="SimSun" panose="02010600030101010101" pitchFamily="2" charset="-122"/>
+                        <a:cs typeface="Times New Roman" panose="02020603050405020304" pitchFamily="18" charset="0"/>
+                      </a:endParaRPr>
+                    </a:p>
+                  </a:txBody>
+                  <a:tcPr marL="9525" marR="9525" marT="9525" marB="9525" anchor="ctr"/>
+                </a:tc>
+                <a:tc>
+                  <a:txBody>
+                    <a:bodyPr/>
+                    <a:lstStyle/>
+                    <a:p>
+                      <a:pPr algn="ctr">
+                        <a:lnSpc>
+                          <a:spcPct val="107000"/>
+                        </a:lnSpc>
+                        <a:spcAft>
+                          <a:spcPts val="0"/>
+                        </a:spcAft>
+                      </a:pPr>
+                      <a:r>
+                        <a:rPr lang="fr-FR" sz="1800">
+                          <a:effectLst/>
+                        </a:rPr>
+                        <a:t>3 à 6</a:t>
+                      </a:r>
+                      <a:endParaRPr lang="fr-FR" sz="1600">
+                        <a:effectLst/>
+                        <a:latin typeface="Calibri" panose="020F0502020204030204" pitchFamily="34" charset="0"/>
+                        <a:ea typeface="SimSun" panose="02010600030101010101" pitchFamily="2" charset="-122"/>
+                        <a:cs typeface="Times New Roman" panose="02020603050405020304" pitchFamily="18" charset="0"/>
+                      </a:endParaRPr>
+                    </a:p>
+                  </a:txBody>
+                  <a:tcPr marL="9525" marR="9525" marT="9525" marB="9525" anchor="ctr"/>
+                </a:tc>
+                <a:tc>
+                  <a:txBody>
+                    <a:bodyPr/>
+                    <a:lstStyle/>
+                    <a:p>
+                      <a:pPr algn="ctr">
+                        <a:lnSpc>
+                          <a:spcPct val="107000"/>
+                        </a:lnSpc>
+                        <a:spcAft>
+                          <a:spcPts val="0"/>
+                        </a:spcAft>
+                      </a:pPr>
+                      <a:r>
+                        <a:rPr lang="fr-FR" sz="1800">
+                          <a:effectLst/>
+                        </a:rPr>
+                        <a:t>28kb/s</a:t>
+                      </a:r>
+                      <a:endParaRPr lang="fr-FR" sz="1600">
+                        <a:effectLst/>
+                        <a:latin typeface="Calibri" panose="020F0502020204030204" pitchFamily="34" charset="0"/>
+                        <a:ea typeface="SimSun" panose="02010600030101010101" pitchFamily="2" charset="-122"/>
+                        <a:cs typeface="Times New Roman" panose="02020603050405020304" pitchFamily="18" charset="0"/>
+                      </a:endParaRPr>
+                    </a:p>
+                  </a:txBody>
+                  <a:tcPr marL="9525" marR="9525" marT="9525" marB="9525" anchor="ctr"/>
+                </a:tc>
+                <a:tc>
+                  <a:txBody>
+                    <a:bodyPr/>
+                    <a:lstStyle/>
+                    <a:p>
+                      <a:pPr algn="ctr">
+                        <a:lnSpc>
+                          <a:spcPct val="107000"/>
+                        </a:lnSpc>
+                        <a:spcAft>
+                          <a:spcPts val="0"/>
+                        </a:spcAft>
+                      </a:pPr>
+                      <a:r>
+                        <a:rPr lang="fr-FR" sz="1800" dirty="0">
+                          <a:effectLst/>
+                        </a:rPr>
+                        <a:t>ISO 18000-6</a:t>
+                      </a:r>
+                      <a:endParaRPr lang="fr-FR" sz="1600" dirty="0">
+                        <a:effectLst/>
+                        <a:latin typeface="Calibri" panose="020F0502020204030204" pitchFamily="34" charset="0"/>
+                        <a:ea typeface="SimSun" panose="02010600030101010101" pitchFamily="2" charset="-122"/>
+                        <a:cs typeface="Times New Roman" panose="02020603050405020304" pitchFamily="18" charset="0"/>
+                      </a:endParaRPr>
+                    </a:p>
+                  </a:txBody>
+                  <a:tcPr marL="9525" marR="9525" marT="9525" marB="9525" anchor="ctr"/>
+                </a:tc>
+                <a:extLst>
+                  <a:ext uri="{0D108BD9-81ED-4DB2-BD59-A6C34878D82A}">
+                    <a16:rowId xmlns:a16="http://schemas.microsoft.com/office/drawing/2014/main" val="2463713348"/>
+                  </a:ext>
+                </a:extLst>
+              </a:tr>
+            </a:tbl>
+          </a:graphicData>
+        </a:graphic>
+      </p:graphicFrame>
+      <p:sp>
+        <p:nvSpPr>
+          <p:cNvPr id="5" name="Rectangle 4"/>
+          <p:cNvSpPr/>
+          <p:nvPr/>
+        </p:nvSpPr>
+        <p:spPr>
+          <a:xfrm>
+            <a:off x="838200" y="2623577"/>
+            <a:ext cx="10515600" cy="369332"/>
+          </a:xfrm>
+          <a:prstGeom prst="rect">
+            <a:avLst/>
+          </a:prstGeom>
+        </p:spPr>
+        <p:txBody>
+          <a:bodyPr wrap="square">
+            <a:spAutoFit/>
+          </a:bodyPr>
+          <a:lstStyle/>
+          <a:p>
+            <a:r>
+              <a:rPr lang="fr-FR" dirty="0">
+                <a:latin typeface="Calibri" panose="020F0502020204030204" pitchFamily="34" charset="0"/>
+                <a:ea typeface="SimSun" panose="02010600030101010101" pitchFamily="2" charset="-122"/>
+                <a:cs typeface="Times New Roman" panose="02020603050405020304" pitchFamily="18" charset="0"/>
+              </a:rPr>
+              <a:t>Les puces se différencient en grande partie par la fréquence de fonctionnement et la distance de lecture.</a:t>
+            </a:r>
+            <a:endParaRPr lang="fr-FR" dirty="0"/>
+          </a:p>
+        </p:txBody>
+      </p:sp>
+      <p:sp>
+        <p:nvSpPr>
+          <p:cNvPr id="6" name="Rectangle 5"/>
+          <p:cNvSpPr/>
+          <p:nvPr/>
+        </p:nvSpPr>
+        <p:spPr>
+          <a:xfrm>
+            <a:off x="838200" y="6053236"/>
+            <a:ext cx="10515600" cy="388696"/>
+          </a:xfrm>
+          <a:prstGeom prst="rect">
+            <a:avLst/>
+          </a:prstGeom>
+        </p:spPr>
+        <p:txBody>
+          <a:bodyPr wrap="square">
+            <a:spAutoFit/>
+          </a:bodyPr>
+          <a:lstStyle/>
+          <a:p>
+            <a:pPr algn="just">
+              <a:lnSpc>
+                <a:spcPct val="107000"/>
+              </a:lnSpc>
+              <a:spcAft>
+                <a:spcPts val="800"/>
+              </a:spcAft>
+            </a:pPr>
+            <a:r>
+              <a:rPr lang="fr-FR" dirty="0">
+                <a:latin typeface="Calibri" panose="020F0502020204030204" pitchFamily="34" charset="0"/>
+                <a:ea typeface="SimSun" panose="02010600030101010101" pitchFamily="2" charset="-122"/>
+                <a:cs typeface="Times New Roman" panose="02020603050405020304" pitchFamily="18" charset="0"/>
+              </a:rPr>
+              <a:t>Nous allons utiliser la fréquence de 13.56 Mhz, soit la haute fréquence.</a:t>
+            </a:r>
           </a:p>
         </p:txBody>
       </p:sp>
@@ -4336,7 +5408,7 @@
         </p:nvSpPr>
         <p:spPr>
           <a:xfrm>
-            <a:off x="838200" y="1995854"/>
+            <a:off x="838200" y="1824036"/>
             <a:ext cx="10515600" cy="4304202"/>
           </a:xfrm>
         </p:spPr>
@@ -4350,10 +5422,135 @@
               <a:buNone/>
             </a:pPr>
             <a:r>
+              <a:rPr lang="fr-FR" sz="2400" dirty="0"/>
+              <a:t>c) Les capacités de la puce </a:t>
+            </a:r>
+            <a:r>
               <a:rPr lang="fr-FR" sz="2400" dirty="0" smtClean="0"/>
-              <a:t>d) Choix du RFID</a:t>
-            </a:r>
+              <a:t>RFID</a:t>
+            </a:r>
+          </a:p>
+          <a:p>
+            <a:pPr marL="0" indent="0">
+              <a:buNone/>
+            </a:pPr>
             <a:endParaRPr lang="fr-FR" sz="2400" dirty="0"/>
+          </a:p>
+          <a:p>
+            <a:pPr marL="0" indent="0">
+              <a:buNone/>
+            </a:pPr>
+            <a:endParaRPr lang="fr-FR" sz="2400" dirty="0" smtClean="0"/>
+          </a:p>
+          <a:p>
+            <a:pPr marL="0" indent="0">
+              <a:buNone/>
+            </a:pPr>
+            <a:endParaRPr lang="fr-FR" sz="2400" dirty="0"/>
+          </a:p>
+          <a:p>
+            <a:pPr marL="0" indent="0">
+              <a:buNone/>
+            </a:pPr>
+            <a:endParaRPr lang="fr-FR" sz="2400" dirty="0" smtClean="0"/>
+          </a:p>
+          <a:p>
+            <a:pPr marL="0" indent="0">
+              <a:buNone/>
+            </a:pPr>
+            <a:endParaRPr lang="fr-FR" sz="2400" dirty="0"/>
+          </a:p>
+          <a:p>
+            <a:pPr marL="0" indent="0">
+              <a:buNone/>
+            </a:pPr>
+            <a:endParaRPr lang="fr-FR" sz="2400" dirty="0" smtClean="0"/>
+          </a:p>
+        </p:txBody>
+      </p:sp>
+      <p:sp>
+        <p:nvSpPr>
+          <p:cNvPr id="4" name="Rectangle 3"/>
+          <p:cNvSpPr/>
+          <p:nvPr/>
+        </p:nvSpPr>
+        <p:spPr>
+          <a:xfrm>
+            <a:off x="838200" y="2551612"/>
+            <a:ext cx="10515600" cy="3261149"/>
+          </a:xfrm>
+          <a:prstGeom prst="rect">
+            <a:avLst/>
+          </a:prstGeom>
+        </p:spPr>
+        <p:txBody>
+          <a:bodyPr wrap="square">
+            <a:spAutoFit/>
+          </a:bodyPr>
+          <a:lstStyle/>
+          <a:p>
+            <a:pPr marL="342900" lvl="0" indent="-342900" algn="just">
+              <a:lnSpc>
+                <a:spcPct val="107000"/>
+              </a:lnSpc>
+              <a:spcAft>
+                <a:spcPts val="800"/>
+              </a:spcAft>
+              <a:buFont typeface="Century Gothic" panose="020B0502020202020204" pitchFamily="34" charset="0"/>
+              <a:buChar char="-"/>
+            </a:pPr>
+            <a:r>
+              <a:rPr lang="fr-FR" dirty="0">
+                <a:latin typeface="Calibri" panose="020F0502020204030204" pitchFamily="34" charset="0"/>
+                <a:ea typeface="SimSun" panose="02010600030101010101" pitchFamily="2" charset="-122"/>
+                <a:cs typeface="Times New Roman" panose="02020603050405020304" pitchFamily="18" charset="0"/>
+              </a:rPr>
+              <a:t>La RFID passive : fonctionne en lecture seule puisque la puce ne possède pas de batterie et doit être déplacé vers le lecteur pour être lu. Un puissant signal électromagnétique lui est alors envoyé, ce qui permet d’activer la puce RFID et de lire les informations qu’elle contient. Avantages : moins couteuse, vie presque illimitée. Inconvénients : courte distance</a:t>
+            </a:r>
+            <a:r>
+              <a:rPr lang="fr-FR" dirty="0" smtClean="0">
+                <a:latin typeface="Calibri" panose="020F0502020204030204" pitchFamily="34" charset="0"/>
+                <a:ea typeface="SimSun" panose="02010600030101010101" pitchFamily="2" charset="-122"/>
+                <a:cs typeface="Times New Roman" panose="02020603050405020304" pitchFamily="18" charset="0"/>
+              </a:rPr>
+              <a:t>.</a:t>
+            </a:r>
+          </a:p>
+          <a:p>
+            <a:pPr lvl="0" algn="just">
+              <a:lnSpc>
+                <a:spcPct val="107000"/>
+              </a:lnSpc>
+              <a:spcAft>
+                <a:spcPts val="800"/>
+              </a:spcAft>
+            </a:pPr>
+            <a:endParaRPr lang="fr-FR" dirty="0" smtClean="0">
+              <a:latin typeface="Calibri" panose="020F0502020204030204" pitchFamily="34" charset="0"/>
+              <a:ea typeface="SimSun" panose="02010600030101010101" pitchFamily="2" charset="-122"/>
+              <a:cs typeface="Times New Roman" panose="02020603050405020304" pitchFamily="18" charset="0"/>
+            </a:endParaRPr>
+          </a:p>
+          <a:p>
+            <a:pPr marL="342900" indent="-342900" algn="just">
+              <a:lnSpc>
+                <a:spcPct val="107000"/>
+              </a:lnSpc>
+              <a:spcAft>
+                <a:spcPts val="800"/>
+              </a:spcAft>
+              <a:buFont typeface="Century Gothic" panose="020B0502020202020204" pitchFamily="34" charset="0"/>
+              <a:buChar char="-"/>
+            </a:pPr>
+            <a:r>
+              <a:rPr lang="fr-FR" dirty="0"/>
+              <a:t>La RFID active : fonctionne avec une source d’énergie telle qu’une petite pile ou une batterie, ce qui permet de lire la carte à plus longue distance. Avantages : ils ont leur propre énergie qui permet d’émettre un signal de manière autonome, longue distance, peuvent communiquer les données sans qu’un lecteur RFID se situe à proximité du tag. Inconvénients : le cout, durée de fonctionnement limité des étiquettes et impact sur la santé très controversé</a:t>
+            </a:r>
+            <a:r>
+              <a:rPr lang="fr-FR" dirty="0" smtClean="0"/>
+              <a:t>.</a:t>
+            </a:r>
+            <a:endParaRPr lang="fr-FR" dirty="0"/>
           </a:p>
         </p:txBody>
       </p:sp>
@@ -4496,147 +5693,246 @@
             <p:ph type="title"/>
           </p:nvPr>
         </p:nvSpPr>
+        <p:spPr/>
+        <p:txBody>
+          <a:bodyPr>
+            <a:normAutofit/>
+          </a:bodyPr>
+          <a:lstStyle/>
+          <a:p>
+            <a:r>
+              <a:rPr lang="fr-FR" sz="2800" b="1" dirty="0"/>
+              <a:t>2) Utilisation et choix du RFID</a:t>
+            </a:r>
+            <a:endParaRPr lang="fr-FR" sz="2800" dirty="0"/>
+          </a:p>
+        </p:txBody>
+      </p:sp>
+      <p:sp>
+        <p:nvSpPr>
+          <p:cNvPr id="3" name="Espace réservé du contenu 2"/>
+          <p:cNvSpPr>
+            <a:spLocks noGrp="1"/>
+          </p:cNvSpPr>
+          <p:nvPr>
+            <p:ph idx="1"/>
+          </p:nvPr>
+        </p:nvSpPr>
+        <p:spPr/>
+        <p:txBody>
+          <a:bodyPr>
+            <a:normAutofit/>
+          </a:bodyPr>
+          <a:lstStyle/>
+          <a:p>
+            <a:pPr marL="0" indent="0">
+              <a:buNone/>
+            </a:pPr>
+            <a:r>
+              <a:rPr lang="fr-FR" sz="2400" dirty="0"/>
+              <a:t>d</a:t>
+            </a:r>
+            <a:r>
+              <a:rPr lang="fr-FR" sz="2400" dirty="0" smtClean="0"/>
+              <a:t>) Choix du RFID </a:t>
+            </a:r>
+            <a:endParaRPr lang="fr-FR" sz="2400" dirty="0"/>
+          </a:p>
+        </p:txBody>
+      </p:sp>
+      <p:pic>
+        <p:nvPicPr>
+          <p:cNvPr id="4" name="Image 3" descr="Résultat de recherche d'images pour &quot;DAG system rfid&quot;"/>
+          <p:cNvPicPr/>
+          <p:nvPr/>
+        </p:nvPicPr>
+        <p:blipFill rotWithShape="1">
+          <a:blip r:embed="rId2" cstate="print">
+            <a:extLst>
+              <a:ext uri="{28A0092B-C50C-407E-A947-70E740481C1C}">
+                <a14:useLocalDpi xmlns:a14="http://schemas.microsoft.com/office/drawing/2010/main" val="0"/>
+              </a:ext>
+            </a:extLst>
+          </a:blip>
+          <a:srcRect l="11632" t="7605" r="20232" b="13640"/>
+          <a:stretch/>
+        </p:blipFill>
+        <p:spPr bwMode="auto">
+          <a:xfrm>
+            <a:off x="6849978" y="4186989"/>
+            <a:ext cx="3466331" cy="2390664"/>
+          </a:xfrm>
+          <a:prstGeom prst="rect">
+            <a:avLst/>
+          </a:prstGeom>
+          <a:noFill/>
+          <a:ln>
+            <a:noFill/>
+          </a:ln>
+          <a:extLst>
+            <a:ext uri="{53640926-AAD7-44D8-BBD7-CCE9431645EC}">
+              <a14:shadowObscured xmlns:a14="http://schemas.microsoft.com/office/drawing/2010/main"/>
+            </a:ext>
+          </a:extLst>
+        </p:spPr>
+      </p:pic>
+      <p:sp>
+        <p:nvSpPr>
+          <p:cNvPr id="5" name="Rectangle 4"/>
+          <p:cNvSpPr/>
+          <p:nvPr/>
+        </p:nvSpPr>
         <p:spPr>
           <a:xfrm>
-            <a:off x="334108" y="218708"/>
-            <a:ext cx="10515600" cy="1325563"/>
-          </a:xfrm>
-        </p:spPr>
-        <p:txBody>
-          <a:bodyPr/>
-          <a:lstStyle/>
-          <a:p>
+            <a:off x="838200" y="2591206"/>
+            <a:ext cx="10515600" cy="1754326"/>
+          </a:xfrm>
+          <a:prstGeom prst="rect">
+            <a:avLst/>
+          </a:prstGeom>
+        </p:spPr>
+        <p:txBody>
+          <a:bodyPr wrap="square">
+            <a:spAutoFit/>
+          </a:bodyPr>
+          <a:lstStyle/>
+          <a:p>
+            <a:pPr marL="285750" indent="-285750" algn="just">
+              <a:buFontTx/>
+              <a:buChar char="-"/>
+            </a:pPr>
+            <a:r>
+              <a:rPr lang="fr-FR" dirty="0" smtClean="0">
+                <a:latin typeface="Calibri" panose="020F0502020204030204" pitchFamily="34" charset="0"/>
+                <a:ea typeface="SimSun" panose="02010600030101010101" pitchFamily="2" charset="-122"/>
+                <a:cs typeface="Times New Roman" panose="02020603050405020304" pitchFamily="18" charset="0"/>
+              </a:rPr>
+              <a:t>facile </a:t>
+            </a:r>
             <a:r>
               <a:rPr lang="fr-FR" dirty="0">
-                <a:solidFill>
-                  <a:srgbClr val="FF0000"/>
-                </a:solidFill>
+                <a:latin typeface="Calibri" panose="020F0502020204030204" pitchFamily="34" charset="0"/>
+                <a:ea typeface="SimSun" panose="02010600030101010101" pitchFamily="2" charset="-122"/>
+                <a:cs typeface="Times New Roman" panose="02020603050405020304" pitchFamily="18" charset="0"/>
               </a:rPr>
-              <a:t>Etudiant 2 : Jouen Matthias</a:t>
-            </a:r>
-          </a:p>
-        </p:txBody>
-      </p:sp>
-      <p:sp>
-        <p:nvSpPr>
-          <p:cNvPr id="3" name="Espace réservé du contenu 2"/>
-          <p:cNvSpPr>
-            <a:spLocks noGrp="1"/>
-          </p:cNvSpPr>
-          <p:nvPr>
-            <p:ph idx="1"/>
-          </p:nvPr>
-        </p:nvSpPr>
-        <p:spPr>
-          <a:xfrm>
-            <a:off x="334108" y="1544271"/>
-            <a:ext cx="11019692" cy="5129090"/>
-          </a:xfrm>
-        </p:spPr>
-        <p:txBody>
-          <a:bodyPr>
-            <a:normAutofit lnSpcReduction="10000"/>
-          </a:bodyPr>
-          <a:lstStyle/>
-          <a:p>
-            <a:r>
-              <a:rPr lang="fr-FR" dirty="0"/>
-              <a:t>I) Analyse complète du système</a:t>
-            </a:r>
-          </a:p>
-          <a:p>
-            <a:pPr lvl="1"/>
-            <a:r>
-              <a:rPr lang="fr-FR" dirty="0"/>
-              <a:t>1) Diagramme de cas d’utilisation</a:t>
-            </a:r>
-          </a:p>
-          <a:p>
-            <a:pPr lvl="1"/>
-            <a:r>
-              <a:rPr lang="fr-FR" dirty="0"/>
-              <a:t>2) Diagrammes de séquence</a:t>
-            </a:r>
-          </a:p>
-          <a:p>
-            <a:pPr lvl="2"/>
-            <a:r>
-              <a:rPr lang="fr-FR" dirty="0"/>
-              <a:t>a) Démarrage et déroulement d’une course</a:t>
-            </a:r>
-          </a:p>
-          <a:p>
-            <a:pPr lvl="2"/>
-            <a:r>
-              <a:rPr lang="fr-FR" dirty="0"/>
-              <a:t>b) Afficher le temps de course sur l’afficheur LED</a:t>
-            </a:r>
-          </a:p>
-          <a:p>
-            <a:pPr lvl="1"/>
-            <a:r>
-              <a:rPr lang="fr-FR" dirty="0"/>
-              <a:t>3) Scénario</a:t>
-            </a:r>
-          </a:p>
-          <a:p>
-            <a:r>
-              <a:rPr lang="fr-FR" dirty="0"/>
-              <a:t>II) Etude Physique lecteur RFID pour les courses</a:t>
-            </a:r>
-          </a:p>
-          <a:p>
-            <a:pPr lvl="1"/>
-            <a:r>
-              <a:rPr lang="fr-FR" dirty="0"/>
-              <a:t>1) Matériel</a:t>
-            </a:r>
-          </a:p>
-          <a:p>
-            <a:pPr lvl="2"/>
-            <a:r>
-              <a:rPr lang="fr-FR" dirty="0"/>
-              <a:t>a) Antenne</a:t>
-            </a:r>
-          </a:p>
-          <a:p>
-            <a:pPr lvl="2"/>
-            <a:r>
-              <a:rPr lang="fr-FR" dirty="0"/>
-              <a:t>b) Dossards </a:t>
-            </a:r>
-            <a:r>
-              <a:rPr lang="fr-FR" dirty="0" err="1"/>
-              <a:t>DAGs</a:t>
+              <a:t>d’installer se dossard sur un coureur, </a:t>
+            </a:r>
+            <a:endParaRPr lang="fr-FR" dirty="0" smtClean="0">
+              <a:latin typeface="Calibri" panose="020F0502020204030204" pitchFamily="34" charset="0"/>
+              <a:ea typeface="SimSun" panose="02010600030101010101" pitchFamily="2" charset="-122"/>
+              <a:cs typeface="Times New Roman" panose="02020603050405020304" pitchFamily="18" charset="0"/>
+            </a:endParaRPr>
+          </a:p>
+          <a:p>
+            <a:pPr marL="285750" indent="-285750" algn="just">
+              <a:buFontTx/>
+              <a:buChar char="-"/>
+            </a:pPr>
+            <a:r>
+              <a:rPr lang="fr-FR" dirty="0" smtClean="0">
+                <a:latin typeface="Calibri" panose="020F0502020204030204" pitchFamily="34" charset="0"/>
+                <a:ea typeface="SimSun" panose="02010600030101010101" pitchFamily="2" charset="-122"/>
+                <a:cs typeface="Times New Roman" panose="02020603050405020304" pitchFamily="18" charset="0"/>
+              </a:rPr>
+              <a:t>la </a:t>
+            </a:r>
+            <a:r>
+              <a:rPr lang="fr-FR" dirty="0">
+                <a:latin typeface="Calibri" panose="020F0502020204030204" pitchFamily="34" charset="0"/>
+                <a:ea typeface="SimSun" panose="02010600030101010101" pitchFamily="2" charset="-122"/>
+                <a:cs typeface="Times New Roman" panose="02020603050405020304" pitchFamily="18" charset="0"/>
+              </a:rPr>
+              <a:t>fréquence du dossard est de 13.56 Mhz soit une haute fréquence qui permet d’avoir une distance de lecture de 1 </a:t>
+            </a:r>
+            <a:r>
+              <a:rPr lang="fr-FR" dirty="0" smtClean="0">
+                <a:latin typeface="Calibri" panose="020F0502020204030204" pitchFamily="34" charset="0"/>
+                <a:ea typeface="SimSun" panose="02010600030101010101" pitchFamily="2" charset="-122"/>
+                <a:cs typeface="Times New Roman" panose="02020603050405020304" pitchFamily="18" charset="0"/>
+              </a:rPr>
+              <a:t>m,</a:t>
+            </a:r>
+          </a:p>
+          <a:p>
+            <a:pPr marL="285750" indent="-285750" algn="just">
+              <a:buFontTx/>
+              <a:buChar char="-"/>
+            </a:pPr>
+            <a:r>
+              <a:rPr lang="fr-FR" dirty="0" smtClean="0">
+                <a:latin typeface="Calibri" panose="020F0502020204030204" pitchFamily="34" charset="0"/>
+                <a:ea typeface="SimSun" panose="02010600030101010101" pitchFamily="2" charset="-122"/>
+                <a:cs typeface="Times New Roman" panose="02020603050405020304" pitchFamily="18" charset="0"/>
+              </a:rPr>
+              <a:t>taux </a:t>
+            </a:r>
+            <a:r>
+              <a:rPr lang="fr-FR" dirty="0">
+                <a:latin typeface="Calibri" panose="020F0502020204030204" pitchFamily="34" charset="0"/>
+                <a:ea typeface="SimSun" panose="02010600030101010101" pitchFamily="2" charset="-122"/>
+                <a:cs typeface="Times New Roman" panose="02020603050405020304" pitchFamily="18" charset="0"/>
+              </a:rPr>
+              <a:t>de transfert de 25kb/ </a:t>
+            </a:r>
+            <a:r>
+              <a:rPr lang="fr-FR" dirty="0" smtClean="0">
+                <a:latin typeface="Calibri" panose="020F0502020204030204" pitchFamily="34" charset="0"/>
+                <a:ea typeface="SimSun" panose="02010600030101010101" pitchFamily="2" charset="-122"/>
+                <a:cs typeface="Times New Roman" panose="02020603050405020304" pitchFamily="18" charset="0"/>
+              </a:rPr>
+              <a:t>s</a:t>
+            </a:r>
+            <a:r>
+              <a:rPr lang="fr-FR" dirty="0">
+                <a:latin typeface="Calibri" panose="020F0502020204030204" pitchFamily="34" charset="0"/>
+                <a:ea typeface="SimSun" panose="02010600030101010101" pitchFamily="2" charset="-122"/>
+                <a:cs typeface="Times New Roman" panose="02020603050405020304" pitchFamily="18" charset="0"/>
+              </a:rPr>
+              <a:t>,</a:t>
+            </a:r>
+            <a:endParaRPr lang="fr-FR" dirty="0" smtClean="0">
+              <a:latin typeface="Calibri" panose="020F0502020204030204" pitchFamily="34" charset="0"/>
+              <a:ea typeface="SimSun" panose="02010600030101010101" pitchFamily="2" charset="-122"/>
+              <a:cs typeface="Times New Roman" panose="02020603050405020304" pitchFamily="18" charset="0"/>
+            </a:endParaRPr>
+          </a:p>
+          <a:p>
+            <a:pPr marL="285750" indent="-285750" algn="just">
+              <a:buFontTx/>
+              <a:buChar char="-"/>
+            </a:pPr>
+            <a:r>
+              <a:rPr lang="fr-FR" dirty="0">
+                <a:latin typeface="Calibri" panose="020F0502020204030204" pitchFamily="34" charset="0"/>
+                <a:ea typeface="SimSun" panose="02010600030101010101" pitchFamily="2" charset="-122"/>
+                <a:cs typeface="Times New Roman" panose="02020603050405020304" pitchFamily="18" charset="0"/>
+              </a:rPr>
+              <a:t>d</a:t>
+            </a:r>
+            <a:r>
+              <a:rPr lang="fr-FR" dirty="0" smtClean="0">
+                <a:latin typeface="Calibri" panose="020F0502020204030204" pitchFamily="34" charset="0"/>
+                <a:ea typeface="SimSun" panose="02010600030101010101" pitchFamily="2" charset="-122"/>
+                <a:cs typeface="Times New Roman" panose="02020603050405020304" pitchFamily="18" charset="0"/>
+              </a:rPr>
+              <a:t>e </a:t>
+            </a:r>
+            <a:r>
+              <a:rPr lang="fr-FR" dirty="0">
+                <a:latin typeface="Calibri" panose="020F0502020204030204" pitchFamily="34" charset="0"/>
+                <a:ea typeface="SimSun" panose="02010600030101010101" pitchFamily="2" charset="-122"/>
+                <a:cs typeface="Times New Roman" panose="02020603050405020304" pitchFamily="18" charset="0"/>
+              </a:rPr>
+              <a:t>plus ce dossard utilise la technologie du RFID passive qui est beaucoup moins couteux et qui correspond à nos attentes.</a:t>
             </a:r>
             <a:endParaRPr lang="fr-FR" dirty="0"/>
-          </a:p>
-          <a:p>
-            <a:pPr lvl="1"/>
-            <a:r>
-              <a:rPr lang="fr-FR" dirty="0"/>
-              <a:t>2) Boite noire</a:t>
-            </a:r>
-          </a:p>
-          <a:p>
-            <a:pPr lvl="2"/>
-            <a:r>
-              <a:rPr lang="fr-FR" dirty="0"/>
-              <a:t>a) Principe de fonctionnement</a:t>
-            </a:r>
-          </a:p>
-          <a:p>
-            <a:r>
-              <a:rPr lang="fr-FR" dirty="0"/>
-              <a:t>III) Module de test</a:t>
-            </a:r>
           </a:p>
         </p:txBody>
       </p:sp>
     </p:spTree>
     <p:extLst>
       <p:ext uri="{BB962C8B-B14F-4D97-AF65-F5344CB8AC3E}">
-        <p14:creationId xmlns:p14="http://schemas.microsoft.com/office/powerpoint/2010/main" val="2171075976"/>
+        <p14:creationId xmlns:p14="http://schemas.microsoft.com/office/powerpoint/2010/main" val="4149026334"/>
       </p:ext>
     </p:extLst>
   </p:cSld>
@@ -4675,80 +5971,145 @@
         </p:nvSpPr>
         <p:spPr>
           <a:xfrm>
-            <a:off x="838199" y="0"/>
+            <a:off x="334108" y="218708"/>
             <a:ext cx="10515600" cy="1325563"/>
           </a:xfrm>
         </p:spPr>
         <p:txBody>
+          <a:bodyPr/>
+          <a:lstStyle/>
+          <a:p>
+            <a:r>
+              <a:rPr lang="fr-FR" dirty="0">
+                <a:solidFill>
+                  <a:srgbClr val="FF0000"/>
+                </a:solidFill>
+              </a:rPr>
+              <a:t>Etudiant 2 : Jouen Matthias</a:t>
+            </a:r>
+          </a:p>
+        </p:txBody>
+      </p:sp>
+      <p:sp>
+        <p:nvSpPr>
+          <p:cNvPr id="3" name="Espace réservé du contenu 2"/>
+          <p:cNvSpPr>
+            <a:spLocks noGrp="1"/>
+          </p:cNvSpPr>
+          <p:nvPr>
+            <p:ph idx="1"/>
+          </p:nvPr>
+        </p:nvSpPr>
+        <p:spPr>
+          <a:xfrm>
+            <a:off x="334108" y="1544271"/>
+            <a:ext cx="11019692" cy="5129090"/>
+          </a:xfrm>
+        </p:spPr>
+        <p:txBody>
           <a:bodyPr>
-            <a:noAutofit/>
+            <a:normAutofit lnSpcReduction="10000"/>
           </a:bodyPr>
           <a:lstStyle/>
           <a:p>
-            <a:pPr algn="ctr"/>
-            <a:r>
-              <a:rPr lang="fr-FR" sz="3600" dirty="0"/>
+            <a:r>
+              <a:rPr lang="fr-FR" dirty="0"/>
               <a:t>I) Analyse complète du système</a:t>
             </a:r>
+          </a:p>
+          <a:p>
+            <a:pPr lvl="1"/>
             <a:r>
               <a:rPr lang="fr-FR" dirty="0"/>
-              <a:t/>
-            </a:r>
-            <a:br>
+              <a:t>1) Diagramme de cas d’utilisation</a:t>
+            </a:r>
+          </a:p>
+          <a:p>
+            <a:pPr lvl="1"/>
+            <a:r>
               <a:rPr lang="fr-FR" dirty="0"/>
-            </a:br>
-            <a:r>
-              <a:rPr lang="fr-FR" sz="4000" dirty="0"/>
-              <a:t>	</a:t>
-            </a:r>
-            <a:r>
-              <a:rPr lang="fr-FR" sz="2800" dirty="0"/>
-              <a:t>1) Diagramme de cas d’utilisation</a:t>
-            </a:r>
-            <a:endParaRPr lang="fr-FR" sz="3200" dirty="0"/>
-          </a:p>
-        </p:txBody>
-      </p:sp>
-      <p:pic>
-        <p:nvPicPr>
-          <p:cNvPr id="4" name="Image 3" descr="E:\GitHub\Projet_Cross\Etudiant 2\Diagrammes\UseCase_Etudiant2.PNG"/>
-          <p:cNvPicPr/>
-          <p:nvPr/>
-        </p:nvPicPr>
-        <p:blipFill rotWithShape="1">
-          <a:blip r:embed="rId2">
-            <a:extLst>
-              <a:ext uri="{28A0092B-C50C-407E-A947-70E740481C1C}">
-                <a14:useLocalDpi xmlns:a14="http://schemas.microsoft.com/office/drawing/2010/main" val="0"/>
-              </a:ext>
-            </a:extLst>
-          </a:blip>
-          <a:srcRect t="8558" b="3297"/>
-          <a:stretch/>
-        </p:blipFill>
-        <p:spPr bwMode="auto">
-          <a:xfrm>
-            <a:off x="281432" y="1151792"/>
-            <a:ext cx="11629133" cy="5706208"/>
-          </a:xfrm>
-          <a:prstGeom prst="rect">
-            <a:avLst/>
-          </a:prstGeom>
-          <a:noFill/>
-          <a:ln>
-            <a:noFill/>
-          </a:ln>
-          <a:extLst>
-            <a:ext uri="{53640926-AAD7-44D8-BBD7-CCE9431645EC}">
-              <a14:shadowObscured xmlns:a14="http://schemas.microsoft.com/office/drawing/2010/main"/>
-            </a:ext>
-          </a:extLst>
-        </p:spPr>
-      </p:pic>
+              <a:t>2) Diagrammes de séquence</a:t>
+            </a:r>
+          </a:p>
+          <a:p>
+            <a:pPr lvl="2"/>
+            <a:r>
+              <a:rPr lang="fr-FR" dirty="0"/>
+              <a:t>a) Démarrage et déroulement d’une course</a:t>
+            </a:r>
+          </a:p>
+          <a:p>
+            <a:pPr lvl="2"/>
+            <a:r>
+              <a:rPr lang="fr-FR" dirty="0"/>
+              <a:t>b) Afficher le temps de course sur l’afficheur LED</a:t>
+            </a:r>
+          </a:p>
+          <a:p>
+            <a:pPr lvl="1"/>
+            <a:r>
+              <a:rPr lang="fr-FR" dirty="0"/>
+              <a:t>3) Scénario</a:t>
+            </a:r>
+          </a:p>
+          <a:p>
+            <a:r>
+              <a:rPr lang="fr-FR" dirty="0"/>
+              <a:t>II) Etude Physique lecteur RFID pour les courses</a:t>
+            </a:r>
+          </a:p>
+          <a:p>
+            <a:pPr lvl="1"/>
+            <a:r>
+              <a:rPr lang="fr-FR" dirty="0"/>
+              <a:t>1) Matériel</a:t>
+            </a:r>
+          </a:p>
+          <a:p>
+            <a:pPr lvl="2"/>
+            <a:r>
+              <a:rPr lang="fr-FR" dirty="0"/>
+              <a:t>a) Antenne</a:t>
+            </a:r>
+          </a:p>
+          <a:p>
+            <a:pPr lvl="2"/>
+            <a:r>
+              <a:rPr lang="fr-FR" dirty="0"/>
+              <a:t>b) Dossards </a:t>
+            </a:r>
+            <a:r>
+              <a:rPr lang="fr-FR" dirty="0" err="1"/>
+              <a:t>DAGs</a:t>
+            </a:r>
+            <a:endParaRPr lang="fr-FR" dirty="0"/>
+          </a:p>
+          <a:p>
+            <a:pPr lvl="1"/>
+            <a:r>
+              <a:rPr lang="fr-FR" dirty="0"/>
+              <a:t>2) Boite noire</a:t>
+            </a:r>
+          </a:p>
+          <a:p>
+            <a:pPr lvl="2"/>
+            <a:r>
+              <a:rPr lang="fr-FR" dirty="0"/>
+              <a:t>a) Principe de fonctionnement</a:t>
+            </a:r>
+          </a:p>
+          <a:p>
+            <a:r>
+              <a:rPr lang="fr-FR" dirty="0"/>
+              <a:t>III) Module de test</a:t>
+            </a:r>
+          </a:p>
+        </p:txBody>
+      </p:sp>
     </p:spTree>
     <p:extLst>
       <p:ext uri="{BB962C8B-B14F-4D97-AF65-F5344CB8AC3E}">
-        <p14:creationId xmlns:p14="http://schemas.microsoft.com/office/powerpoint/2010/main" val="1247061660"/>
+        <p14:creationId xmlns:p14="http://schemas.microsoft.com/office/powerpoint/2010/main" val="2171075976"/>
       </p:ext>
     </p:extLst>
   </p:cSld>
@@ -4787,52 +6148,20 @@
         </p:nvSpPr>
         <p:spPr>
           <a:xfrm>
-            <a:off x="759068" y="0"/>
-            <a:ext cx="10515600" cy="1169377"/>
+            <a:off x="838199" y="0"/>
+            <a:ext cx="10515600" cy="1325563"/>
           </a:xfrm>
         </p:spPr>
         <p:txBody>
           <a:bodyPr>
-            <a:normAutofit fontScale="90000"/>
+            <a:noAutofit/>
           </a:bodyPr>
           <a:lstStyle/>
           <a:p>
-            <a:pPr lvl="2" algn="ctr" rtl="0">
-              <a:lnSpc>
-                <a:spcPct val="90000"/>
-              </a:lnSpc>
-              <a:spcBef>
-                <a:spcPct val="0"/>
-              </a:spcBef>
-            </a:pPr>
-            <a:r>
-              <a:rPr lang="fr-FR" sz="3100" dirty="0">
-                <a:latin typeface="+mj-lt"/>
-              </a:rPr>
-              <a:t>2) Diagrammes de séquence</a:t>
-            </a:r>
-            <a:r>
-              <a:rPr lang="fr-FR" sz="3200" dirty="0">
-                <a:latin typeface="+mj-lt"/>
-              </a:rPr>
-              <a:t/>
-            </a:r>
-            <a:br>
-              <a:rPr lang="fr-FR" sz="3200" dirty="0">
-                <a:latin typeface="+mj-lt"/>
-              </a:rPr>
-            </a:br>
-            <a:r>
-              <a:rPr lang="fr-FR" sz="3200" dirty="0">
-                <a:latin typeface="+mj-lt"/>
-              </a:rPr>
-              <a:t>	</a:t>
-            </a:r>
-            <a:r>
-              <a:rPr lang="fr-FR" sz="2400" dirty="0">
-                <a:latin typeface="+mj-lt"/>
-              </a:rPr>
-              <a:t>a) Démarrage et déroulement d’une course</a:t>
+            <a:pPr algn="ctr"/>
+            <a:r>
+              <a:rPr lang="fr-FR" sz="3600" dirty="0"/>
+              <a:t>I) Analyse complète du système</a:t>
             </a:r>
             <a:r>
               <a:rPr lang="fr-FR" dirty="0"/>
@@ -4841,16 +6170,22 @@
             <a:br>
               <a:rPr lang="fr-FR" dirty="0"/>
             </a:br>
+            <a:r>
+              <a:rPr lang="fr-FR" sz="4000" dirty="0"/>
+              <a:t>	</a:t>
+            </a:r>
+            <a:r>
+              <a:rPr lang="fr-FR" sz="2800" dirty="0"/>
+              <a:t>1) Diagramme de cas d’utilisation</a:t>
+            </a:r>
             <a:endParaRPr lang="fr-FR" sz="3200" dirty="0"/>
           </a:p>
         </p:txBody>
       </p:sp>
       <p:pic>
         <p:nvPicPr>
-          <p:cNvPr id="5" name="Image 4"/>
-          <p:cNvPicPr>
-            <a:picLocks noChangeAspect="1"/>
-          </p:cNvPicPr>
+          <p:cNvPr id="4" name="Image 3" descr="E:\GitHub\Projet_Cross\Etudiant 2\Diagrammes\UseCase_Etudiant2.PNG"/>
+          <p:cNvPicPr/>
           <p:nvPr/>
         </p:nvPicPr>
         <p:blipFill rotWithShape="1">
@@ -4861,23 +6196,32 @@
               </a:ext>
             </a:extLst>
           </a:blip>
-          <a:srcRect t="5449" b="5282"/>
+          <a:srcRect t="8558" b="3297"/>
           <a:stretch/>
         </p:blipFill>
-        <p:spPr>
-          <a:xfrm>
-            <a:off x="9019" y="870437"/>
-            <a:ext cx="12015697" cy="5442439"/>
+        <p:spPr bwMode="auto">
+          <a:xfrm>
+            <a:off x="281432" y="1151792"/>
+            <a:ext cx="11629133" cy="5706208"/>
           </a:xfrm>
           <a:prstGeom prst="rect">
             <a:avLst/>
           </a:prstGeom>
+          <a:noFill/>
+          <a:ln>
+            <a:noFill/>
+          </a:ln>
+          <a:extLst>
+            <a:ext uri="{53640926-AAD7-44D8-BBD7-CCE9431645EC}">
+              <a14:shadowObscured xmlns:a14="http://schemas.microsoft.com/office/drawing/2010/main"/>
+            </a:ext>
+          </a:extLst>
         </p:spPr>
       </p:pic>
     </p:spTree>
     <p:extLst>
       <p:ext uri="{BB962C8B-B14F-4D97-AF65-F5344CB8AC3E}">
-        <p14:creationId xmlns:p14="http://schemas.microsoft.com/office/powerpoint/2010/main" val="3709118343"/>
+        <p14:creationId xmlns:p14="http://schemas.microsoft.com/office/powerpoint/2010/main" val="1247061660"/>
       </p:ext>
     </p:extLst>
   </p:cSld>
@@ -4916,13 +6260,13 @@
         </p:nvSpPr>
         <p:spPr>
           <a:xfrm>
-            <a:off x="838200" y="0"/>
-            <a:ext cx="10515600" cy="514106"/>
+            <a:off x="759068" y="0"/>
+            <a:ext cx="10515600" cy="1169377"/>
           </a:xfrm>
         </p:spPr>
         <p:txBody>
           <a:bodyPr>
-            <a:normAutofit/>
+            <a:normAutofit fontScale="90000"/>
           </a:bodyPr>
           <a:lstStyle/>
           <a:p>
@@ -4935,14 +6279,42 @@
               </a:spcBef>
             </a:pPr>
             <a:r>
+              <a:rPr lang="fr-FR" sz="3100" dirty="0">
+                <a:latin typeface="+mj-lt"/>
+              </a:rPr>
+              <a:t>2) Diagrammes de séquence</a:t>
+            </a:r>
+            <a:r>
+              <a:rPr lang="fr-FR" sz="3200" dirty="0">
+                <a:latin typeface="+mj-lt"/>
+              </a:rPr>
+              <a:t/>
+            </a:r>
+            <a:br>
+              <a:rPr lang="fr-FR" sz="3200" dirty="0">
+                <a:latin typeface="+mj-lt"/>
+              </a:rPr>
+            </a:br>
+            <a:r>
+              <a:rPr lang="fr-FR" sz="3200" dirty="0">
+                <a:latin typeface="+mj-lt"/>
+              </a:rPr>
+              <a:t>	</a:t>
+            </a:r>
+            <a:r>
               <a:rPr lang="fr-FR" sz="2400" dirty="0">
                 <a:latin typeface="+mj-lt"/>
               </a:rPr>
-              <a:t>b) Afficher le temps de course sur l’afficheur LED</a:t>
-            </a:r>
-            <a:endParaRPr lang="fr-FR" sz="3200" dirty="0">
-              <a:latin typeface="+mj-lt"/>
-            </a:endParaRPr>
+              <a:t>a) Démarrage et déroulement d’une course</a:t>
+            </a:r>
+            <a:r>
+              <a:rPr lang="fr-FR" dirty="0"/>
+              <a:t/>
+            </a:r>
+            <a:br>
+              <a:rPr lang="fr-FR" dirty="0"/>
+            </a:br>
+            <a:endParaRPr lang="fr-FR" sz="3200" dirty="0"/>
           </a:p>
         </p:txBody>
       </p:sp>
@@ -4962,13 +6334,13 @@
               </a:ext>
             </a:extLst>
           </a:blip>
-          <a:srcRect t="6145"/>
+          <a:srcRect t="5449" b="5282"/>
           <a:stretch/>
         </p:blipFill>
         <p:spPr>
           <a:xfrm>
-            <a:off x="501162" y="597878"/>
-            <a:ext cx="11302167" cy="5874810"/>
+            <a:off x="9019" y="870437"/>
+            <a:ext cx="12015697" cy="5442439"/>
           </a:xfrm>
           <a:prstGeom prst="rect">
             <a:avLst/>
@@ -4978,7 +6350,7 @@
     </p:spTree>
     <p:extLst>
       <p:ext uri="{BB962C8B-B14F-4D97-AF65-F5344CB8AC3E}">
-        <p14:creationId xmlns:p14="http://schemas.microsoft.com/office/powerpoint/2010/main" val="1677811779"/>
+        <p14:creationId xmlns:p14="http://schemas.microsoft.com/office/powerpoint/2010/main" val="3709118343"/>
       </p:ext>
     </p:extLst>
   </p:cSld>
@@ -5018,7 +6390,7 @@
         <p:spPr>
           <a:xfrm>
             <a:off x="838200" y="0"/>
-            <a:ext cx="10515600" cy="487729"/>
+            <a:ext cx="10515600" cy="514106"/>
           </a:xfrm>
         </p:spPr>
         <p:txBody>
@@ -5027,132 +6399,59 @@
           </a:bodyPr>
           <a:lstStyle/>
           <a:p>
-            <a:pPr algn="ctr"/>
-            <a:r>
-              <a:rPr lang="fr-FR" sz="2800" dirty="0"/>
-              <a:t>3) Scénario</a:t>
-            </a:r>
-          </a:p>
-        </p:txBody>
-      </p:sp>
-      <p:sp>
-        <p:nvSpPr>
-          <p:cNvPr id="3" name="Espace réservé du contenu 2"/>
-          <p:cNvSpPr>
-            <a:spLocks noGrp="1"/>
-          </p:cNvSpPr>
-          <p:nvPr>
-            <p:ph idx="1"/>
-          </p:nvPr>
-        </p:nvSpPr>
+            <a:pPr lvl="2" algn="ctr" rtl="0">
+              <a:lnSpc>
+                <a:spcPct val="90000"/>
+              </a:lnSpc>
+              <a:spcBef>
+                <a:spcPct val="0"/>
+              </a:spcBef>
+            </a:pPr>
+            <a:r>
+              <a:rPr lang="fr-FR" sz="2400" dirty="0">
+                <a:latin typeface="+mj-lt"/>
+              </a:rPr>
+              <a:t>b) Afficher le temps de course sur l’afficheur LED</a:t>
+            </a:r>
+            <a:endParaRPr lang="fr-FR" sz="3200" dirty="0">
+              <a:latin typeface="+mj-lt"/>
+            </a:endParaRPr>
+          </a:p>
+        </p:txBody>
+      </p:sp>
+      <p:pic>
+        <p:nvPicPr>
+          <p:cNvPr id="5" name="Image 4"/>
+          <p:cNvPicPr>
+            <a:picLocks noChangeAspect="1"/>
+          </p:cNvPicPr>
+          <p:nvPr/>
+        </p:nvPicPr>
+        <p:blipFill rotWithShape="1">
+          <a:blip r:embed="rId2">
+            <a:extLst>
+              <a:ext uri="{28A0092B-C50C-407E-A947-70E740481C1C}">
+                <a14:useLocalDpi xmlns:a14="http://schemas.microsoft.com/office/drawing/2010/main" val="0"/>
+              </a:ext>
+            </a:extLst>
+          </a:blip>
+          <a:srcRect t="6145"/>
+          <a:stretch/>
+        </p:blipFill>
         <p:spPr>
           <a:xfrm>
-            <a:off x="838200" y="805717"/>
-            <a:ext cx="10515600" cy="5217014"/>
-          </a:xfrm>
-        </p:spPr>
-        <p:txBody>
-          <a:bodyPr>
-            <a:normAutofit fontScale="92500" lnSpcReduction="20000"/>
-          </a:bodyPr>
-          <a:lstStyle/>
-          <a:p>
-            <a:pPr lvl="0"/>
-            <a:r>
-              <a:rPr lang="fr-FR" sz="2400" dirty="0"/>
-              <a:t>Le commissaire de course lance l’application C++.</a:t>
-            </a:r>
-          </a:p>
-          <a:p>
-            <a:pPr marL="0" lvl="0" indent="0">
-              <a:buNone/>
-            </a:pPr>
-            <a:r>
-              <a:rPr lang="fr-FR" sz="2400" dirty="0"/>
-              <a:t> </a:t>
-            </a:r>
-          </a:p>
-          <a:p>
-            <a:pPr lvl="0"/>
-            <a:r>
-              <a:rPr lang="fr-FR" sz="2400" dirty="0"/>
-              <a:t>Il va sélectionner la course qu’il voudra démarrer.</a:t>
-            </a:r>
-          </a:p>
-          <a:p>
-            <a:pPr marL="0" lvl="0" indent="0">
-              <a:buNone/>
-            </a:pPr>
-            <a:endParaRPr lang="fr-FR" sz="2400" dirty="0"/>
-          </a:p>
-          <a:p>
-            <a:pPr lvl="0"/>
-            <a:r>
-              <a:rPr lang="fr-FR" sz="2400" dirty="0"/>
-              <a:t>Il va ensuite cliquer sur le bouton de démarrage de la course.</a:t>
-            </a:r>
-          </a:p>
-          <a:p>
-            <a:pPr marL="0" lvl="0" indent="0">
-              <a:buNone/>
-            </a:pPr>
-            <a:endParaRPr lang="fr-FR" sz="2400" dirty="0"/>
-          </a:p>
-          <a:p>
-            <a:pPr lvl="0"/>
-            <a:r>
-              <a:rPr lang="fr-FR" sz="2400" dirty="0"/>
-              <a:t>Une fois la course démarrée, il pourra cliquer sur « afficheur LED » s’il y en a un. </a:t>
-            </a:r>
-          </a:p>
-          <a:p>
-            <a:pPr marL="0" lvl="0" indent="0">
-              <a:buNone/>
-            </a:pPr>
-            <a:endParaRPr lang="fr-FR" sz="2400" dirty="0"/>
-          </a:p>
-          <a:p>
-            <a:pPr lvl="0"/>
-            <a:r>
-              <a:rPr lang="fr-FR" sz="2400" dirty="0"/>
-              <a:t>L’afficheur LED va afficher le temps du premier ou/et le temps moyen des coureurs.</a:t>
-            </a:r>
-          </a:p>
-          <a:p>
-            <a:pPr marL="0" lvl="0" indent="0">
-              <a:buNone/>
-            </a:pPr>
-            <a:endParaRPr lang="fr-FR" sz="2400" dirty="0"/>
-          </a:p>
-          <a:p>
-            <a:pPr lvl="0"/>
-            <a:r>
-              <a:rPr lang="fr-FR" sz="2400" dirty="0"/>
-              <a:t> Quand le lecteur RFID aura détecté un coureur, il enverra ses informations à la base de données.</a:t>
-            </a:r>
-          </a:p>
-          <a:p>
-            <a:pPr marL="0" lvl="0" indent="0">
-              <a:buNone/>
-            </a:pPr>
-            <a:endParaRPr lang="fr-FR" sz="2400" dirty="0"/>
-          </a:p>
-          <a:p>
-            <a:pPr lvl="0"/>
-            <a:r>
-              <a:rPr lang="fr-FR" sz="2400" dirty="0"/>
-              <a:t>Les informations pourront être ensuite traitées.</a:t>
-            </a:r>
-          </a:p>
-          <a:p>
-            <a:endParaRPr lang="fr-FR" dirty="0"/>
-          </a:p>
-        </p:txBody>
-      </p:sp>
+            <a:off x="501162" y="597878"/>
+            <a:ext cx="11302167" cy="5874810"/>
+          </a:xfrm>
+          <a:prstGeom prst="rect">
+            <a:avLst/>
+          </a:prstGeom>
+        </p:spPr>
+      </p:pic>
     </p:spTree>
     <p:extLst>
       <p:ext uri="{BB962C8B-B14F-4D97-AF65-F5344CB8AC3E}">
-        <p14:creationId xmlns:p14="http://schemas.microsoft.com/office/powerpoint/2010/main" val="1024622025"/>
+        <p14:creationId xmlns:p14="http://schemas.microsoft.com/office/powerpoint/2010/main" val="1677811779"/>
       </p:ext>
     </p:extLst>
   </p:cSld>
@@ -5191,75 +6490,133 @@
         </p:nvSpPr>
         <p:spPr>
           <a:xfrm>
-            <a:off x="838200" y="-1"/>
-            <a:ext cx="10515600" cy="1512277"/>
+            <a:off x="838200" y="0"/>
+            <a:ext cx="10515600" cy="487729"/>
           </a:xfrm>
         </p:spPr>
         <p:txBody>
           <a:bodyPr>
-            <a:normAutofit fontScale="90000"/>
+            <a:normAutofit/>
           </a:bodyPr>
           <a:lstStyle/>
           <a:p>
-            <a:r>
-              <a:rPr lang="fr-FR" sz="3600" dirty="0"/>
-              <a:t>II) Etude physique lecteur RFID pour les courses</a:t>
-            </a:r>
-            <a:br>
-              <a:rPr lang="fr-FR" sz="3600" dirty="0"/>
-            </a:br>
-            <a:r>
-              <a:rPr lang="fr-FR" sz="3600" dirty="0"/>
-              <a:t>	</a:t>
-            </a:r>
-            <a:r>
-              <a:rPr lang="fr-FR" sz="3100" dirty="0"/>
-              <a:t>1) Matériel</a:t>
-            </a:r>
+            <a:pPr algn="ctr"/>
             <a:r>
               <a:rPr lang="fr-FR" sz="2800" dirty="0"/>
-              <a:t/>
-            </a:r>
-            <a:br>
-              <a:rPr lang="fr-FR" sz="2800" dirty="0"/>
-            </a:br>
-            <a:r>
-              <a:rPr lang="fr-FR" sz="2800" dirty="0"/>
-              <a:t>		</a:t>
-            </a:r>
+              <a:t>3) Scénario</a:t>
+            </a:r>
+          </a:p>
+        </p:txBody>
+      </p:sp>
+      <p:sp>
+        <p:nvSpPr>
+          <p:cNvPr id="3" name="Espace réservé du contenu 2"/>
+          <p:cNvSpPr>
+            <a:spLocks noGrp="1"/>
+          </p:cNvSpPr>
+          <p:nvPr>
+            <p:ph idx="1"/>
+          </p:nvPr>
+        </p:nvSpPr>
+        <p:spPr>
+          <a:xfrm>
+            <a:off x="838200" y="805717"/>
+            <a:ext cx="10515600" cy="5217014"/>
+          </a:xfrm>
+        </p:spPr>
+        <p:txBody>
+          <a:bodyPr>
+            <a:normAutofit fontScale="92500" lnSpcReduction="20000"/>
+          </a:bodyPr>
+          <a:lstStyle/>
+          <a:p>
+            <a:pPr lvl="0"/>
             <a:r>
               <a:rPr lang="fr-FR" sz="2400" dirty="0"/>
-              <a:t>a) Antenne</a:t>
-            </a:r>
-            <a:br>
+              <a:t>Le commissaire de course lance l’application C++.</a:t>
+            </a:r>
+          </a:p>
+          <a:p>
+            <a:pPr marL="0" lvl="0" indent="0">
+              <a:buNone/>
+            </a:pPr>
+            <a:r>
               <a:rPr lang="fr-FR" sz="2400" dirty="0"/>
-            </a:br>
+              <a:t> </a:t>
+            </a:r>
+          </a:p>
+          <a:p>
+            <a:pPr lvl="0"/>
             <a:r>
               <a:rPr lang="fr-FR" sz="2400" dirty="0"/>
-              <a:t>		b) Dossard </a:t>
-            </a:r>
-            <a:r>
-              <a:rPr lang="fr-FR" sz="2400" dirty="0" err="1"/>
-              <a:t>DAGs</a:t>
-            </a:r>
-            <a:endParaRPr lang="fr-FR" sz="3600" dirty="0"/>
-          </a:p>
-        </p:txBody>
-      </p:sp>
-      <p:sp>
-        <p:nvSpPr>
-          <p:cNvPr id="3" name="Espace réservé du contenu 2"/>
-          <p:cNvSpPr>
-            <a:spLocks noGrp="1"/>
-          </p:cNvSpPr>
-          <p:nvPr>
-            <p:ph idx="1"/>
-          </p:nvPr>
-        </p:nvSpPr>
-        <p:spPr/>
-        <p:txBody>
-          <a:bodyPr/>
-          <a:lstStyle/>
+              <a:t>Il va sélectionner la course qu’il voudra démarrer.</a:t>
+            </a:r>
+          </a:p>
+          <a:p>
+            <a:pPr marL="0" lvl="0" indent="0">
+              <a:buNone/>
+            </a:pPr>
+            <a:endParaRPr lang="fr-FR" sz="2400" dirty="0"/>
+          </a:p>
+          <a:p>
+            <a:pPr lvl="0"/>
+            <a:r>
+              <a:rPr lang="fr-FR" sz="2400" dirty="0"/>
+              <a:t>Il va ensuite cliquer sur le bouton de démarrage de la course.</a:t>
+            </a:r>
+          </a:p>
+          <a:p>
+            <a:pPr marL="0" lvl="0" indent="0">
+              <a:buNone/>
+            </a:pPr>
+            <a:endParaRPr lang="fr-FR" sz="2400" dirty="0"/>
+          </a:p>
+          <a:p>
+            <a:pPr lvl="0"/>
+            <a:r>
+              <a:rPr lang="fr-FR" sz="2400" dirty="0"/>
+              <a:t>Une fois la course démarrée, il pourra cliquer sur « afficheur LED » s’il y en a un. </a:t>
+            </a:r>
+          </a:p>
+          <a:p>
+            <a:pPr marL="0" lvl="0" indent="0">
+              <a:buNone/>
+            </a:pPr>
+            <a:endParaRPr lang="fr-FR" sz="2400" dirty="0"/>
+          </a:p>
+          <a:p>
+            <a:pPr lvl="0"/>
+            <a:r>
+              <a:rPr lang="fr-FR" sz="2400" dirty="0"/>
+              <a:t>L’afficheur LED va afficher le temps du premier ou/et le temps moyen des coureurs.</a:t>
+            </a:r>
+          </a:p>
+          <a:p>
+            <a:pPr marL="0" lvl="0" indent="0">
+              <a:buNone/>
+            </a:pPr>
+            <a:endParaRPr lang="fr-FR" sz="2400" dirty="0"/>
+          </a:p>
+          <a:p>
+            <a:pPr lvl="0"/>
+            <a:r>
+              <a:rPr lang="fr-FR" sz="2400" dirty="0"/>
+              <a:t> Quand le lecteur RFID aura détecté un coureur, il enverra ses informations à la base de données.</a:t>
+            </a:r>
+          </a:p>
+          <a:p>
+            <a:pPr marL="0" lvl="0" indent="0">
+              <a:buNone/>
+            </a:pPr>
+            <a:endParaRPr lang="fr-FR" sz="2400" dirty="0"/>
+          </a:p>
+          <a:p>
+            <a:pPr lvl="0"/>
+            <a:r>
+              <a:rPr lang="fr-FR" sz="2400" dirty="0"/>
+              <a:t>Les informations pourront être ensuite traitées.</a:t>
+            </a:r>
+          </a:p>
           <a:p>
             <a:endParaRPr lang="fr-FR" dirty="0"/>
           </a:p>
@@ -5268,7 +6625,7 @@
     </p:spTree>
     <p:extLst>
       <p:ext uri="{BB962C8B-B14F-4D97-AF65-F5344CB8AC3E}">
-        <p14:creationId xmlns:p14="http://schemas.microsoft.com/office/powerpoint/2010/main" val="2600805086"/>
+        <p14:creationId xmlns:p14="http://schemas.microsoft.com/office/powerpoint/2010/main" val="1024622025"/>
       </p:ext>
     </p:extLst>
   </p:cSld>
@@ -5307,32 +6664,58 @@
         </p:nvSpPr>
         <p:spPr>
           <a:xfrm>
-            <a:off x="838200" y="0"/>
-            <a:ext cx="10515600" cy="864211"/>
+            <a:off x="838200" y="-1"/>
+            <a:ext cx="10515600" cy="1512277"/>
           </a:xfrm>
         </p:spPr>
         <p:txBody>
           <a:bodyPr>
-            <a:normAutofit/>
+            <a:normAutofit fontScale="90000"/>
           </a:bodyPr>
           <a:lstStyle/>
           <a:p>
             <a:r>
+              <a:rPr lang="fr-FR" sz="3600" dirty="0"/>
+              <a:t>II) Etude physique lecteur RFID pour les courses</a:t>
+            </a:r>
+            <a:br>
+              <a:rPr lang="fr-FR" sz="3600" dirty="0"/>
+            </a:br>
+            <a:r>
+              <a:rPr lang="fr-FR" sz="3600" dirty="0"/>
+              <a:t>	</a:t>
+            </a:r>
+            <a:r>
+              <a:rPr lang="fr-FR" sz="3100" dirty="0"/>
+              <a:t>1) Matériel</a:t>
+            </a:r>
+            <a:r>
               <a:rPr lang="fr-FR" sz="2800" dirty="0"/>
-              <a:t>2) Boite noire</a:t>
+              <a:t/>
             </a:r>
             <a:br>
               <a:rPr lang="fr-FR" sz="2800" dirty="0"/>
             </a:br>
             <a:r>
               <a:rPr lang="fr-FR" sz="2800" dirty="0"/>
-              <a:t>	</a:t>
+              <a:t>		</a:t>
             </a:r>
             <a:r>
               <a:rPr lang="fr-FR" sz="2400" dirty="0"/>
-              <a:t>a) Principe de fonctionnement</a:t>
-            </a:r>
-            <a:endParaRPr lang="fr-FR" sz="2800" dirty="0"/>
+              <a:t>a) Antenne</a:t>
+            </a:r>
+            <a:br>
+              <a:rPr lang="fr-FR" sz="2400" dirty="0"/>
+            </a:br>
+            <a:r>
+              <a:rPr lang="fr-FR" sz="2400" dirty="0"/>
+              <a:t>		b) Dossard </a:t>
+            </a:r>
+            <a:r>
+              <a:rPr lang="fr-FR" sz="2400" dirty="0" err="1"/>
+              <a:t>DAGs</a:t>
+            </a:r>
+            <a:endParaRPr lang="fr-FR" sz="3600" dirty="0"/>
           </a:p>
         </p:txBody>
       </p:sp>
@@ -5351,9 +6734,6 @@
           <a:bodyPr/>
           <a:lstStyle/>
           <a:p>
-            <a:pPr marL="0" indent="0">
-              <a:buNone/>
-            </a:pPr>
             <a:endParaRPr lang="fr-FR" dirty="0"/>
           </a:p>
         </p:txBody>
@@ -5361,7 +6741,7 @@
     </p:spTree>
     <p:extLst>
       <p:ext uri="{BB962C8B-B14F-4D97-AF65-F5344CB8AC3E}">
-        <p14:creationId xmlns:p14="http://schemas.microsoft.com/office/powerpoint/2010/main" val="4282450701"/>
+        <p14:creationId xmlns:p14="http://schemas.microsoft.com/office/powerpoint/2010/main" val="2600805086"/>
       </p:ext>
     </p:extLst>
   </p:cSld>
@@ -5398,162 +6778,63 @@
             <p:ph type="title"/>
           </p:nvPr>
         </p:nvSpPr>
+        <p:spPr>
+          <a:xfrm>
+            <a:off x="838200" y="0"/>
+            <a:ext cx="10515600" cy="864211"/>
+          </a:xfrm>
+        </p:spPr>
+        <p:txBody>
+          <a:bodyPr>
+            <a:normAutofit/>
+          </a:bodyPr>
+          <a:lstStyle/>
+          <a:p>
+            <a:r>
+              <a:rPr lang="fr-FR" sz="2800" dirty="0"/>
+              <a:t>2) Boite noire</a:t>
+            </a:r>
+            <a:br>
+              <a:rPr lang="fr-FR" sz="2800" dirty="0"/>
+            </a:br>
+            <a:r>
+              <a:rPr lang="fr-FR" sz="2800" dirty="0"/>
+              <a:t>	</a:t>
+            </a:r>
+            <a:r>
+              <a:rPr lang="fr-FR" sz="2400" dirty="0"/>
+              <a:t>a) Principe de fonctionnement</a:t>
+            </a:r>
+            <a:endParaRPr lang="fr-FR" sz="2800" dirty="0"/>
+          </a:p>
+        </p:txBody>
+      </p:sp>
+      <p:sp>
+        <p:nvSpPr>
+          <p:cNvPr id="3" name="Espace réservé du contenu 2"/>
+          <p:cNvSpPr>
+            <a:spLocks noGrp="1"/>
+          </p:cNvSpPr>
+          <p:nvPr>
+            <p:ph idx="1"/>
+          </p:nvPr>
+        </p:nvSpPr>
         <p:spPr/>
         <p:txBody>
           <a:bodyPr/>
           <a:lstStyle/>
           <a:p>
-            <a:r>
-              <a:rPr lang="fr-FR" dirty="0">
-                <a:solidFill>
-                  <a:schemeClr val="accent6">
-                    <a:lumMod val="75000"/>
-                  </a:schemeClr>
-                </a:solidFill>
-              </a:rPr>
-              <a:t>Etudiant 3 : </a:t>
-            </a:r>
-            <a:r>
-              <a:rPr lang="fr-FR" dirty="0" err="1">
-                <a:solidFill>
-                  <a:schemeClr val="accent6">
-                    <a:lumMod val="75000"/>
-                  </a:schemeClr>
-                </a:solidFill>
-              </a:rPr>
-              <a:t>Lapraye</a:t>
-            </a:r>
-            <a:r>
-              <a:rPr lang="fr-FR" dirty="0">
-                <a:solidFill>
-                  <a:schemeClr val="accent6">
-                    <a:lumMod val="75000"/>
-                  </a:schemeClr>
-                </a:solidFill>
-              </a:rPr>
-              <a:t> Serge</a:t>
-            </a:r>
-          </a:p>
-        </p:txBody>
-      </p:sp>
-      <p:sp>
-        <p:nvSpPr>
-          <p:cNvPr id="3" name="Espace réservé du contenu 2"/>
-          <p:cNvSpPr>
-            <a:spLocks noGrp="1"/>
-          </p:cNvSpPr>
-          <p:nvPr>
-            <p:ph idx="1"/>
-          </p:nvPr>
-        </p:nvSpPr>
-        <p:spPr/>
-        <p:txBody>
-          <a:bodyPr>
-            <a:normAutofit fontScale="92500" lnSpcReduction="20000"/>
-          </a:bodyPr>
-          <a:lstStyle/>
-          <a:p>
-            <a:r>
-              <a:rPr lang="fr-FR" dirty="0"/>
-              <a:t>I) Analyse complète du système</a:t>
-            </a:r>
-          </a:p>
-          <a:p>
-            <a:pPr lvl="1"/>
-            <a:r>
-              <a:rPr lang="fr-FR" dirty="0"/>
-              <a:t>1) Diagramme de cas d’utilisation</a:t>
-            </a:r>
-          </a:p>
-          <a:p>
-            <a:pPr lvl="1"/>
-            <a:r>
-              <a:rPr lang="fr-FR" dirty="0"/>
-              <a:t>2) Scénario</a:t>
-            </a:r>
-          </a:p>
-          <a:p>
-            <a:pPr lvl="1"/>
-            <a:r>
-              <a:rPr lang="fr-FR" dirty="0"/>
-              <a:t>3) Diagramme de séquence</a:t>
-            </a:r>
-          </a:p>
-          <a:p>
-            <a:pPr lvl="2"/>
-            <a:r>
-              <a:rPr lang="fr-FR" dirty="0"/>
-              <a:t>a) Affichage des infos en temps réels</a:t>
-            </a:r>
-          </a:p>
-          <a:p>
-            <a:pPr lvl="2"/>
-            <a:r>
-              <a:rPr lang="fr-FR" dirty="0"/>
-              <a:t>b) Switch de page de par le C++</a:t>
-            </a:r>
-          </a:p>
-          <a:p>
-            <a:r>
-              <a:rPr lang="fr-FR" dirty="0"/>
-              <a:t>II) Etude physique du WI-FI</a:t>
-            </a:r>
-          </a:p>
-          <a:p>
-            <a:pPr lvl="1"/>
-            <a:r>
-              <a:rPr lang="fr-FR" dirty="0"/>
-              <a:t>1) Fonctionnement</a:t>
-            </a:r>
-          </a:p>
-          <a:p>
-            <a:pPr lvl="2"/>
-            <a:r>
-              <a:rPr lang="fr-FR" dirty="0"/>
-              <a:t>a) Introduction du wifi</a:t>
-            </a:r>
-          </a:p>
-          <a:p>
-            <a:pPr lvl="2"/>
-            <a:r>
-              <a:rPr lang="fr-FR" dirty="0"/>
-              <a:t>b) Principe du wifi</a:t>
-            </a:r>
-          </a:p>
-          <a:p>
-            <a:pPr lvl="2"/>
-            <a:r>
-              <a:rPr lang="fr-FR" dirty="0"/>
-              <a:t>c) Principes de fonctionnements</a:t>
-            </a:r>
-          </a:p>
-          <a:p>
-            <a:pPr lvl="1"/>
-            <a:r>
-              <a:rPr lang="fr-FR" dirty="0"/>
-              <a:t>2) Utilisation et choix du WI-FI</a:t>
-            </a:r>
-          </a:p>
-          <a:p>
-            <a:pPr lvl="2"/>
-            <a:r>
-              <a:rPr lang="fr-FR" dirty="0"/>
-              <a:t>a) Utilisation précise du wifi</a:t>
-            </a:r>
-          </a:p>
-          <a:p>
-            <a:pPr lvl="2"/>
-            <a:r>
-              <a:rPr lang="fr-FR" dirty="0"/>
-              <a:t>b) Le choix du wifi</a:t>
-            </a:r>
+            <a:pPr marL="0" indent="0">
+              <a:buNone/>
+            </a:pPr>
+            <a:endParaRPr lang="fr-FR" dirty="0"/>
           </a:p>
         </p:txBody>
       </p:sp>
     </p:spTree>
     <p:extLst>
       <p:ext uri="{BB962C8B-B14F-4D97-AF65-F5344CB8AC3E}">
-        <p14:creationId xmlns:p14="http://schemas.microsoft.com/office/powerpoint/2010/main" val="1010092771"/>
+        <p14:creationId xmlns:p14="http://schemas.microsoft.com/office/powerpoint/2010/main" val="4282450701"/>
       </p:ext>
     </p:extLst>
   </p:cSld>
@@ -5590,76 +6871,162 @@
             <p:ph type="title"/>
           </p:nvPr>
         </p:nvSpPr>
-        <p:spPr>
-          <a:xfrm>
-            <a:off x="838199" y="1"/>
-            <a:ext cx="10515600" cy="923192"/>
-          </a:xfrm>
-        </p:spPr>
+        <p:spPr/>
+        <p:txBody>
+          <a:bodyPr/>
+          <a:lstStyle/>
+          <a:p>
+            <a:r>
+              <a:rPr lang="fr-FR" dirty="0">
+                <a:solidFill>
+                  <a:schemeClr val="accent6">
+                    <a:lumMod val="75000"/>
+                  </a:schemeClr>
+                </a:solidFill>
+              </a:rPr>
+              <a:t>Etudiant 3 : </a:t>
+            </a:r>
+            <a:r>
+              <a:rPr lang="fr-FR" dirty="0" err="1">
+                <a:solidFill>
+                  <a:schemeClr val="accent6">
+                    <a:lumMod val="75000"/>
+                  </a:schemeClr>
+                </a:solidFill>
+              </a:rPr>
+              <a:t>Lapraye</a:t>
+            </a:r>
+            <a:r>
+              <a:rPr lang="fr-FR" dirty="0">
+                <a:solidFill>
+                  <a:schemeClr val="accent6">
+                    <a:lumMod val="75000"/>
+                  </a:schemeClr>
+                </a:solidFill>
+              </a:rPr>
+              <a:t> Serge</a:t>
+            </a:r>
+          </a:p>
+        </p:txBody>
+      </p:sp>
+      <p:sp>
+        <p:nvSpPr>
+          <p:cNvPr id="3" name="Espace réservé du contenu 2"/>
+          <p:cNvSpPr>
+            <a:spLocks noGrp="1"/>
+          </p:cNvSpPr>
+          <p:nvPr>
+            <p:ph idx="1"/>
+          </p:nvPr>
+        </p:nvSpPr>
+        <p:spPr/>
         <p:txBody>
           <a:bodyPr>
-            <a:noAutofit/>
+            <a:normAutofit fontScale="92500" lnSpcReduction="20000"/>
           </a:bodyPr>
           <a:lstStyle/>
           <a:p>
-            <a:pPr algn="ctr"/>
-            <a:r>
-              <a:rPr lang="fr-FR" sz="3200" dirty="0"/>
+            <a:r>
+              <a:rPr lang="fr-FR" dirty="0"/>
               <a:t>I) Analyse complète du système</a:t>
             </a:r>
-            <a:r>
-              <a:rPr lang="fr-FR" sz="4000" dirty="0"/>
-              <a:t/>
-            </a:r>
-            <a:br>
-              <a:rPr lang="fr-FR" sz="4000" dirty="0"/>
-            </a:br>
-            <a:r>
-              <a:rPr lang="fr-FR" sz="3600" dirty="0"/>
-              <a:t>	</a:t>
-            </a:r>
-            <a:r>
-              <a:rPr lang="fr-FR" sz="2400" dirty="0"/>
+          </a:p>
+          <a:p>
+            <a:pPr lvl="1"/>
+            <a:r>
+              <a:rPr lang="fr-FR" dirty="0"/>
               <a:t>1) Diagramme de cas d’utilisation</a:t>
             </a:r>
-            <a:endParaRPr lang="fr-FR" sz="2800" dirty="0"/>
-          </a:p>
-        </p:txBody>
-      </p:sp>
-      <p:pic>
-        <p:nvPicPr>
-          <p:cNvPr id="7" name="Picture 6">
-            <a:extLst>
-              <a:ext uri="{FF2B5EF4-FFF2-40B4-BE49-F238E27FC236}">
-                <a16:creationId xmlns:a16="http://schemas.microsoft.com/office/drawing/2014/main" id="{D1498DC8-3A56-4B21-92A2-73E08A61791E}"/>
-              </a:ext>
-            </a:extLst>
-          </p:cNvPr>
-          <p:cNvPicPr>
-            <a:picLocks noChangeAspect="1"/>
-          </p:cNvPicPr>
-          <p:nvPr/>
-        </p:nvPicPr>
-        <p:blipFill>
-          <a:blip r:embed="rId2"/>
-          <a:stretch>
-            <a:fillRect/>
-          </a:stretch>
-        </p:blipFill>
-        <p:spPr>
-          <a:xfrm>
-            <a:off x="1205948" y="1029211"/>
-            <a:ext cx="10274302" cy="5923722"/>
-          </a:xfrm>
-          <a:prstGeom prst="rect">
-            <a:avLst/>
-          </a:prstGeom>
-        </p:spPr>
-      </p:pic>
+          </a:p>
+          <a:p>
+            <a:pPr lvl="1"/>
+            <a:r>
+              <a:rPr lang="fr-FR" dirty="0"/>
+              <a:t>2) Scénario</a:t>
+            </a:r>
+          </a:p>
+          <a:p>
+            <a:pPr lvl="1"/>
+            <a:r>
+              <a:rPr lang="fr-FR" dirty="0"/>
+              <a:t>3) Diagramme de séquence</a:t>
+            </a:r>
+          </a:p>
+          <a:p>
+            <a:pPr lvl="2"/>
+            <a:r>
+              <a:rPr lang="fr-FR" dirty="0"/>
+              <a:t>a) Affichage des infos en temps réels</a:t>
+            </a:r>
+          </a:p>
+          <a:p>
+            <a:pPr lvl="2"/>
+            <a:r>
+              <a:rPr lang="fr-FR" dirty="0"/>
+              <a:t>b) Switch de page de par le C++</a:t>
+            </a:r>
+          </a:p>
+          <a:p>
+            <a:r>
+              <a:rPr lang="fr-FR" dirty="0"/>
+              <a:t>II) Etude physique du WI-FI</a:t>
+            </a:r>
+          </a:p>
+          <a:p>
+            <a:pPr lvl="1"/>
+            <a:r>
+              <a:rPr lang="fr-FR" dirty="0"/>
+              <a:t>1) Fonctionnement</a:t>
+            </a:r>
+          </a:p>
+          <a:p>
+            <a:pPr lvl="2"/>
+            <a:r>
+              <a:rPr lang="fr-FR" dirty="0"/>
+              <a:t>a) Introduction du wifi</a:t>
+            </a:r>
+          </a:p>
+          <a:p>
+            <a:pPr lvl="2"/>
+            <a:r>
+              <a:rPr lang="fr-FR" dirty="0"/>
+              <a:t>b) Principe du wifi</a:t>
+            </a:r>
+          </a:p>
+          <a:p>
+            <a:pPr lvl="2"/>
+            <a:r>
+              <a:rPr lang="fr-FR" dirty="0"/>
+              <a:t>c) Principes de fonctionnements</a:t>
+            </a:r>
+          </a:p>
+          <a:p>
+            <a:pPr lvl="1"/>
+            <a:r>
+              <a:rPr lang="fr-FR" dirty="0"/>
+              <a:t>2) Utilisation et choix du WI-FI</a:t>
+            </a:r>
+          </a:p>
+          <a:p>
+            <a:pPr lvl="2"/>
+            <a:r>
+              <a:rPr lang="fr-FR" dirty="0"/>
+              <a:t>a) Utilisation précise du wifi</a:t>
+            </a:r>
+          </a:p>
+          <a:p>
+            <a:pPr lvl="2"/>
+            <a:r>
+              <a:rPr lang="fr-FR" dirty="0"/>
+              <a:t>b) Le choix du wifi</a:t>
+            </a:r>
+          </a:p>
+        </p:txBody>
+      </p:sp>
     </p:spTree>
     <p:extLst>
       <p:ext uri="{BB962C8B-B14F-4D97-AF65-F5344CB8AC3E}">
-        <p14:creationId xmlns:p14="http://schemas.microsoft.com/office/powerpoint/2010/main" val="2859212620"/>
+        <p14:creationId xmlns:p14="http://schemas.microsoft.com/office/powerpoint/2010/main" val="1010092771"/>
       </p:ext>
     </p:extLst>
   </p:cSld>
@@ -5698,87 +7065,74 @@
         </p:nvSpPr>
         <p:spPr>
           <a:xfrm>
-            <a:off x="838200" y="0"/>
-            <a:ext cx="10515600" cy="487729"/>
+            <a:off x="838199" y="1"/>
+            <a:ext cx="10515600" cy="923192"/>
           </a:xfrm>
         </p:spPr>
         <p:txBody>
           <a:bodyPr>
-            <a:normAutofit/>
+            <a:noAutofit/>
           </a:bodyPr>
           <a:lstStyle/>
           <a:p>
             <a:pPr algn="ctr"/>
             <a:r>
-              <a:rPr lang="fr-FR" sz="2800" dirty="0"/>
-              <a:t>2) Scénario</a:t>
-            </a:r>
-          </a:p>
-        </p:txBody>
-      </p:sp>
-      <p:sp>
-        <p:nvSpPr>
-          <p:cNvPr id="3" name="Espace réservé du contenu 2"/>
-          <p:cNvSpPr>
-            <a:spLocks noGrp="1"/>
-          </p:cNvSpPr>
-          <p:nvPr>
-            <p:ph idx="1"/>
-          </p:nvPr>
-        </p:nvSpPr>
+              <a:rPr lang="fr-FR" sz="3200" dirty="0"/>
+              <a:t>I) Analyse complète du système</a:t>
+            </a:r>
+            <a:r>
+              <a:rPr lang="fr-FR" sz="4000" dirty="0"/>
+              <a:t/>
+            </a:r>
+            <a:br>
+              <a:rPr lang="fr-FR" sz="4000" dirty="0"/>
+            </a:br>
+            <a:r>
+              <a:rPr lang="fr-FR" sz="3600" dirty="0"/>
+              <a:t>	</a:t>
+            </a:r>
+            <a:r>
+              <a:rPr lang="fr-FR" sz="2400" dirty="0"/>
+              <a:t>1) Diagramme de cas d’utilisation</a:t>
+            </a:r>
+            <a:endParaRPr lang="fr-FR" sz="2800" dirty="0"/>
+          </a:p>
+        </p:txBody>
+      </p:sp>
+      <p:pic>
+        <p:nvPicPr>
+          <p:cNvPr id="7" name="Picture 6">
+            <a:extLst>
+              <a:ext uri="{FF2B5EF4-FFF2-40B4-BE49-F238E27FC236}">
+                <a16:creationId xmlns:a16="http://schemas.microsoft.com/office/drawing/2014/main" id="{D1498DC8-3A56-4B21-92A2-73E08A61791E}"/>
+              </a:ext>
+            </a:extLst>
+          </p:cNvPr>
+          <p:cNvPicPr>
+            <a:picLocks noChangeAspect="1"/>
+          </p:cNvPicPr>
+          <p:nvPr/>
+        </p:nvPicPr>
+        <p:blipFill>
+          <a:blip r:embed="rId2"/>
+          <a:stretch>
+            <a:fillRect/>
+          </a:stretch>
+        </p:blipFill>
         <p:spPr>
           <a:xfrm>
-            <a:off x="360485" y="805716"/>
-            <a:ext cx="10993315" cy="5647837"/>
-          </a:xfrm>
-        </p:spPr>
-        <p:txBody>
-          <a:bodyPr>
-            <a:normAutofit fontScale="92500" lnSpcReduction="10000"/>
-          </a:bodyPr>
-          <a:lstStyle/>
-          <a:p>
-            <a:r>
-              <a:rPr lang="fr-FR" sz="2600" dirty="0"/>
-              <a:t>1 . L’utilisateur à fini sa course et veut connaître son classement donc il se rend sur le site et  renseigne ses identifiants . Une fois connecté il appuie sur le bouton « afficher le classement » et son classement s’affiche  .</a:t>
-            </a:r>
-          </a:p>
-          <a:p>
-            <a:r>
-              <a:rPr lang="fr-FR" sz="2600" dirty="0"/>
-              <a:t>2 . L’utilisateur veut connaître son classement par rapport à sa classe donc il se rend sur le site et  appuie sur l’onglet « afficher le classement par classe » . Le classement se trie par rapport aux participants de la classe de l’utilisateur et affiche un nouveau classement.</a:t>
-            </a:r>
-          </a:p>
-          <a:p>
-            <a:r>
-              <a:rPr lang="fr-FR" sz="2600" dirty="0"/>
-              <a:t>3 . L’utilisateur veut afficher son temps de course donc il se rend sur le site et appuie sur l’onglet « afficher le temps de course » et le temps de course de l’utilisateur s’affiche .</a:t>
-            </a:r>
-          </a:p>
-          <a:p>
-            <a:r>
-              <a:rPr lang="fr-FR" sz="2600" dirty="0"/>
-              <a:t>4 . L’utilisateur veut connaître la moyenne du temps de course donc il appuie sur l’onglet « Afficher la moyenne du temps de course » et la moyenne du temps de course s’affiche et l’utilisateur peut comparer son temps avec celui de la course. </a:t>
-            </a:r>
-          </a:p>
-          <a:p>
-            <a:r>
-              <a:rPr lang="fr-FR" sz="2600" dirty="0"/>
-              <a:t>5. L’utilisateur veut se renseigner sur la prochaine course programmé et se rend sur le site , si une course est programmé il apprend la date de celle – ci autrement , il aperçoit le message « aucune course est programmé prochainement » . </a:t>
-            </a:r>
-          </a:p>
-          <a:p>
-            <a:pPr marL="0" indent="0">
-              <a:buNone/>
-            </a:pPr>
-            <a:endParaRPr lang="fr-FR" dirty="0"/>
-          </a:p>
-        </p:txBody>
-      </p:sp>
+            <a:off x="1205948" y="1029211"/>
+            <a:ext cx="10274302" cy="5923722"/>
+          </a:xfrm>
+          <a:prstGeom prst="rect">
+            <a:avLst/>
+          </a:prstGeom>
+        </p:spPr>
+      </p:pic>
     </p:spTree>
     <p:extLst>
       <p:ext uri="{BB962C8B-B14F-4D97-AF65-F5344CB8AC3E}">
-        <p14:creationId xmlns:p14="http://schemas.microsoft.com/office/powerpoint/2010/main" val="266929531"/>
+        <p14:creationId xmlns:p14="http://schemas.microsoft.com/office/powerpoint/2010/main" val="2859212620"/>
       </p:ext>
     </p:extLst>
   </p:cSld>
@@ -5914,6 +7268,125 @@
         </p:nvSpPr>
         <p:spPr>
           <a:xfrm>
+            <a:off x="838200" y="0"/>
+            <a:ext cx="10515600" cy="487729"/>
+          </a:xfrm>
+        </p:spPr>
+        <p:txBody>
+          <a:bodyPr>
+            <a:normAutofit/>
+          </a:bodyPr>
+          <a:lstStyle/>
+          <a:p>
+            <a:pPr algn="ctr"/>
+            <a:r>
+              <a:rPr lang="fr-FR" sz="2800" dirty="0"/>
+              <a:t>2) Scénario</a:t>
+            </a:r>
+          </a:p>
+        </p:txBody>
+      </p:sp>
+      <p:sp>
+        <p:nvSpPr>
+          <p:cNvPr id="3" name="Espace réservé du contenu 2"/>
+          <p:cNvSpPr>
+            <a:spLocks noGrp="1"/>
+          </p:cNvSpPr>
+          <p:nvPr>
+            <p:ph idx="1"/>
+          </p:nvPr>
+        </p:nvSpPr>
+        <p:spPr>
+          <a:xfrm>
+            <a:off x="360485" y="805716"/>
+            <a:ext cx="10993315" cy="5647837"/>
+          </a:xfrm>
+        </p:spPr>
+        <p:txBody>
+          <a:bodyPr>
+            <a:normAutofit fontScale="92500" lnSpcReduction="10000"/>
+          </a:bodyPr>
+          <a:lstStyle/>
+          <a:p>
+            <a:r>
+              <a:rPr lang="fr-FR" sz="2600" dirty="0"/>
+              <a:t>1 . L’utilisateur à fini sa course et veut connaître son classement donc il se rend sur le site et  renseigne ses identifiants . Une fois connecté il appuie sur le bouton « afficher le classement » et son classement s’affiche  .</a:t>
+            </a:r>
+          </a:p>
+          <a:p>
+            <a:r>
+              <a:rPr lang="fr-FR" sz="2600" dirty="0"/>
+              <a:t>2 . L’utilisateur veut connaître son classement par rapport à sa classe donc il se rend sur le site et  appuie sur l’onglet « afficher le classement par classe » . Le classement se trie par rapport aux participants de la classe de l’utilisateur et affiche un nouveau classement.</a:t>
+            </a:r>
+          </a:p>
+          <a:p>
+            <a:r>
+              <a:rPr lang="fr-FR" sz="2600" dirty="0"/>
+              <a:t>3 . L’utilisateur veut afficher son temps de course donc il se rend sur le site et appuie sur l’onglet « afficher le temps de course » et le temps de course de l’utilisateur s’affiche .</a:t>
+            </a:r>
+          </a:p>
+          <a:p>
+            <a:r>
+              <a:rPr lang="fr-FR" sz="2600" dirty="0"/>
+              <a:t>4 . L’utilisateur veut connaître la moyenne du temps de course donc il appuie sur l’onglet « Afficher la moyenne du temps de course » et la moyenne du temps de course s’affiche et l’utilisateur peut comparer son temps avec celui de la course. </a:t>
+            </a:r>
+          </a:p>
+          <a:p>
+            <a:r>
+              <a:rPr lang="fr-FR" sz="2600" dirty="0"/>
+              <a:t>5. L’utilisateur veut se renseigner sur la prochaine course programmé et se rend sur le site , si une course est programmé il apprend la date de celle – ci autrement , il aperçoit le message « aucune course est programmé prochainement » . </a:t>
+            </a:r>
+          </a:p>
+          <a:p>
+            <a:pPr marL="0" indent="0">
+              <a:buNone/>
+            </a:pPr>
+            <a:endParaRPr lang="fr-FR" dirty="0"/>
+          </a:p>
+        </p:txBody>
+      </p:sp>
+    </p:spTree>
+    <p:extLst>
+      <p:ext uri="{BB962C8B-B14F-4D97-AF65-F5344CB8AC3E}">
+        <p14:creationId xmlns:p14="http://schemas.microsoft.com/office/powerpoint/2010/main" val="266929531"/>
+      </p:ext>
+    </p:extLst>
+  </p:cSld>
+  <p:clrMapOvr>
+    <a:masterClrMapping/>
+  </p:clrMapOvr>
+</p:sld>
+</file>
+
+<file path=ppt/slides/slide31.xml><?xml version="1.0" encoding="utf-8"?>
+<p:sld xmlns:a="http://schemas.openxmlformats.org/drawingml/2006/main" xmlns:r="http://schemas.openxmlformats.org/officeDocument/2006/relationships" xmlns:p="http://schemas.openxmlformats.org/presentationml/2006/main">
+  <p:cSld>
+    <p:spTree>
+      <p:nvGrpSpPr>
+        <p:cNvPr id="1" name=""/>
+        <p:cNvGrpSpPr/>
+        <p:nvPr/>
+      </p:nvGrpSpPr>
+      <p:grpSpPr>
+        <a:xfrm>
+          <a:off x="0" y="0"/>
+          <a:ext cx="0" cy="0"/>
+          <a:chOff x="0" y="0"/>
+          <a:chExt cx="0" cy="0"/>
+        </a:xfrm>
+      </p:grpSpPr>
+      <p:sp>
+        <p:nvSpPr>
+          <p:cNvPr id="2" name="Titre 1"/>
+          <p:cNvSpPr>
+            <a:spLocks noGrp="1"/>
+          </p:cNvSpPr>
+          <p:nvPr>
+            <p:ph type="title"/>
+          </p:nvPr>
+        </p:nvSpPr>
+        <p:spPr>
+          <a:xfrm>
             <a:off x="759068" y="0"/>
             <a:ext cx="10515600" cy="1169377"/>
           </a:xfrm>
@@ -6014,7 +7487,7 @@
 </p:sld>
 </file>
 
-<file path=ppt/slides/slide31.xml><?xml version="1.0" encoding="utf-8"?>
+<file path=ppt/slides/slide32.xml><?xml version="1.0" encoding="utf-8"?>
 <p:sld xmlns:a="http://schemas.openxmlformats.org/drawingml/2006/main" xmlns:r="http://schemas.openxmlformats.org/officeDocument/2006/relationships" xmlns:p="http://schemas.openxmlformats.org/presentationml/2006/main">
   <p:cSld>
     <p:spTree>
@@ -6533,8 +8006,13 @@
             <a:pPr lvl="2"/>
             <a:r>
               <a:rPr lang="fr-FR" dirty="0"/>
-              <a:t>d) Pourquoi choisir cela ?</a:t>
-            </a:r>
+              <a:t>d) </a:t>
+            </a:r>
+            <a:r>
+              <a:rPr lang="fr-FR" dirty="0" smtClean="0"/>
+              <a:t>Choix du RFID</a:t>
+            </a:r>
+            <a:endParaRPr lang="fr-FR" dirty="0"/>
           </a:p>
           <a:p>
             <a:r>

</xml_diff>